<commit_message>
Initial Animal classes created
</commit_message>
<xml_diff>
--- a/Week 05/IN710 OOSD 2016 5.1- Factory Patterns.pptx
+++ b/Week 05/IN710 OOSD 2016 5.1- Factory Patterns.pptx
@@ -174,7 +174,7 @@
   </p:defaultTextStyle>
   <p:extLst>
     <p:ext uri="{EFAFB233-063F-42B5-8137-9DF3F51BA10A}">
-      <p15:sldGuideLst xmlns:p15="http://schemas.microsoft.com/office/powerpoint/2012/main" xmlns="">
+      <p15:sldGuideLst xmlns:p15="http://schemas.microsoft.com/office/powerpoint/2012/main">
         <p15:guide id="1" orient="horz" pos="2160">
           <p15:clr>
             <a:srgbClr val="A4A3A4"/>
@@ -298,7 +298,7 @@
               <a:pPr>
                 <a:defRPr/>
               </a:pPr>
-              <a:t>3/12/2016</a:t>
+              <a:t>3/15/2016</a:t>
             </a:fld>
             <a:endParaRPr lang="en-NZ"/>
           </a:p>
@@ -494,7 +494,7 @@
     </p:spTree>
     <p:extLst>
       <p:ext uri="{BB962C8B-B14F-4D97-AF65-F5344CB8AC3E}">
-        <p14:creationId xmlns:p14="http://schemas.microsoft.com/office/powerpoint/2010/main" xmlns="" val="2750747381"/>
+        <p14:creationId xmlns:p14="http://schemas.microsoft.com/office/powerpoint/2010/main" val="2750747381"/>
       </p:ext>
     </p:extLst>
   </p:cSld>
@@ -663,7 +663,7 @@
           </a:ln>
           <a:extLst>
             <a:ext uri="{909E8E84-426E-40DD-AFC4-6F175D3DCCD1}">
-              <a14:hiddenFill xmlns:a14="http://schemas.microsoft.com/office/drawing/2010/main" xmlns="">
+              <a14:hiddenFill xmlns:a14="http://schemas.microsoft.com/office/drawing/2010/main">
                 <a:solidFill>
                   <a:srgbClr val="FFFFFF"/>
                 </a:solidFill>
@@ -776,7 +776,7 @@
     </p:spTree>
     <p:extLst>
       <p:ext uri="{BB962C8B-B14F-4D97-AF65-F5344CB8AC3E}">
-        <p14:creationId xmlns:p14="http://schemas.microsoft.com/office/powerpoint/2010/main" xmlns="" val="3810861243"/>
+        <p14:creationId xmlns:p14="http://schemas.microsoft.com/office/powerpoint/2010/main" val="3810861243"/>
       </p:ext>
     </p:extLst>
   </p:cSld>
@@ -858,19 +858,7 @@
             </a:r>
             <a:r>
               <a:rPr lang="en-NZ" baseline="0" dirty="0" smtClean="0"/>
-              <a:t> Form </a:t>
-            </a:r>
-            <a:r>
-              <a:rPr lang="en-NZ" baseline="0" dirty="0" smtClean="0"/>
-              <a:t>will </a:t>
-            </a:r>
-            <a:r>
-              <a:rPr lang="en-NZ" baseline="0" dirty="0" smtClean="0"/>
-              <a:t>pass in the </a:t>
-            </a:r>
-            <a:r>
-              <a:rPr lang="en-NZ" baseline="0" dirty="0" smtClean="0"/>
-              <a:t>index via the </a:t>
+              <a:t> Form will pass in the index via the </a:t>
             </a:r>
             <a:r>
               <a:rPr lang="en-NZ" baseline="0" dirty="0" err="1" smtClean="0"/>
@@ -904,7 +892,6 @@
               <a:rPr lang="en-NZ" baseline="0" dirty="0" smtClean="0"/>
               <a:t>(1)...</a:t>
             </a:r>
-            <a:endParaRPr lang="en-NZ" baseline="0" dirty="0" smtClean="0"/>
           </a:p>
           <a:p>
             <a:pPr marL="171673" indent="-171673">
@@ -913,11 +900,7 @@
             </a:pPr>
             <a:r>
               <a:rPr lang="en-NZ" baseline="0" dirty="0" smtClean="0"/>
-              <a:t>Grab the values and use </a:t>
-            </a:r>
-            <a:r>
-              <a:rPr lang="en-NZ" baseline="0" dirty="0" smtClean="0"/>
-              <a:t>them – access the character in the corresponding position and output appropriately to the </a:t>
+              <a:t>Grab the values and use them – access the character in the corresponding position and output appropriately to the </a:t>
             </a:r>
             <a:r>
               <a:rPr lang="en-NZ" baseline="0" dirty="0" err="1" smtClean="0"/>
@@ -980,7 +963,7 @@
     </p:spTree>
     <p:extLst>
       <p:ext uri="{BB962C8B-B14F-4D97-AF65-F5344CB8AC3E}">
-        <p14:creationId xmlns:p14="http://schemas.microsoft.com/office/powerpoint/2010/main" xmlns="" val="1677018993"/>
+        <p14:creationId xmlns:p14="http://schemas.microsoft.com/office/powerpoint/2010/main" val="1677018993"/>
       </p:ext>
     </p:extLst>
   </p:cSld>
@@ -1029,7 +1012,7 @@
           </a:ln>
           <a:extLst>
             <a:ext uri="{909E8E84-426E-40DD-AFC4-6F175D3DCCD1}">
-              <a14:hiddenFill xmlns:a14="http://schemas.microsoft.com/office/drawing/2010/main" xmlns="">
+              <a14:hiddenFill xmlns:a14="http://schemas.microsoft.com/office/drawing/2010/main">
                 <a:solidFill>
                   <a:srgbClr val="FFFFFF"/>
                 </a:solidFill>
@@ -1052,14 +1035,14 @@
           <a:noFill/>
           <a:extLst>
             <a:ext uri="{909E8E84-426E-40DD-AFC4-6F175D3DCCD1}">
-              <a14:hiddenFill xmlns:a14="http://schemas.microsoft.com/office/drawing/2010/main" xmlns="">
+              <a14:hiddenFill xmlns:a14="http://schemas.microsoft.com/office/drawing/2010/main">
                 <a:solidFill>
                   <a:srgbClr val="FFFFFF"/>
                 </a:solidFill>
               </a14:hiddenFill>
             </a:ext>
             <a:ext uri="{91240B29-F687-4F45-9708-019B960494DF}">
-              <a14:hiddenLine xmlns:a14="http://schemas.microsoft.com/office/drawing/2010/main" xmlns="" w="9525">
+              <a14:hiddenLine xmlns:a14="http://schemas.microsoft.com/office/drawing/2010/main" w="9525">
                 <a:solidFill>
                   <a:srgbClr val="000000"/>
                 </a:solidFill>
@@ -1100,27 +1083,11 @@
             </a:pPr>
             <a:r>
               <a:rPr lang="en-NZ" dirty="0" smtClean="0"/>
-              <a:t>If there is a witch </a:t>
-            </a:r>
-            <a:r>
-              <a:rPr lang="en-NZ" dirty="0" smtClean="0"/>
-              <a:t>“behind</a:t>
+              <a:t>If there is a witch “behind</a:t>
             </a:r>
             <a:r>
               <a:rPr lang="en-NZ" baseline="0" dirty="0" smtClean="0"/>
-              <a:t> </a:t>
-            </a:r>
-            <a:r>
-              <a:rPr lang="en-NZ" baseline="0" dirty="0" smtClean="0"/>
-              <a:t>door </a:t>
-            </a:r>
-            <a:r>
-              <a:rPr lang="en-NZ" baseline="0" dirty="0" smtClean="0"/>
-              <a:t>1”, (i.e. in </a:t>
-            </a:r>
-            <a:r>
-              <a:rPr lang="en-NZ" baseline="0" dirty="0" smtClean="0"/>
-              <a:t>the first position of the </a:t>
+              <a:t> door 1”, (i.e. in the first position of the </a:t>
             </a:r>
             <a:r>
               <a:rPr lang="en-NZ" baseline="0" dirty="0" err="1" smtClean="0"/>
@@ -1271,7 +1238,7 @@
     </p:spTree>
     <p:extLst>
       <p:ext uri="{BB962C8B-B14F-4D97-AF65-F5344CB8AC3E}">
-        <p14:creationId xmlns:p14="http://schemas.microsoft.com/office/powerpoint/2010/main" xmlns="" val="1294670759"/>
+        <p14:creationId xmlns:p14="http://schemas.microsoft.com/office/powerpoint/2010/main" val="1294670759"/>
       </p:ext>
     </p:extLst>
   </p:cSld>
@@ -1336,11 +1303,7 @@
             </a:pPr>
             <a:r>
               <a:rPr lang="en-NZ" dirty="0" smtClean="0"/>
-              <a:t>The method </a:t>
-            </a:r>
-            <a:r>
-              <a:rPr lang="en-NZ" dirty="0" smtClean="0"/>
-              <a:t>we are really interested in.</a:t>
+              <a:t>The method we are really interested in.</a:t>
             </a:r>
           </a:p>
           <a:p>
@@ -1458,11 +1421,7 @@
             </a:pPr>
             <a:r>
               <a:rPr lang="en-NZ" dirty="0" smtClean="0"/>
-              <a:t>If you can’t see it, consider what would happen if we decided to add a new kind of game character, say a Unicorn</a:t>
-            </a:r>
-            <a:r>
-              <a:rPr lang="en-NZ" dirty="0" smtClean="0"/>
-              <a:t>.</a:t>
+              <a:t>If you can’t see it, consider what would happen if we decided to add a new kind of game character, say a Unicorn.</a:t>
             </a:r>
           </a:p>
           <a:p>
@@ -1642,7 +1601,7 @@
     </p:spTree>
     <p:extLst>
       <p:ext uri="{BB962C8B-B14F-4D97-AF65-F5344CB8AC3E}">
-        <p14:creationId xmlns:p14="http://schemas.microsoft.com/office/powerpoint/2010/main" xmlns="" val="1156247366"/>
+        <p14:creationId xmlns:p14="http://schemas.microsoft.com/office/powerpoint/2010/main" val="1156247366"/>
       </p:ext>
     </p:extLst>
   </p:cSld>
@@ -1691,7 +1650,7 @@
           </a:ln>
           <a:extLst>
             <a:ext uri="{909E8E84-426E-40DD-AFC4-6F175D3DCCD1}">
-              <a14:hiddenFill xmlns:a14="http://schemas.microsoft.com/office/drawing/2010/main" xmlns="">
+              <a14:hiddenFill xmlns:a14="http://schemas.microsoft.com/office/drawing/2010/main">
                 <a:solidFill>
                   <a:srgbClr val="FFFFFF"/>
                 </a:solidFill>
@@ -1714,14 +1673,14 @@
           <a:noFill/>
           <a:extLst>
             <a:ext uri="{909E8E84-426E-40DD-AFC4-6F175D3DCCD1}">
-              <a14:hiddenFill xmlns:a14="http://schemas.microsoft.com/office/drawing/2010/main" xmlns="">
+              <a14:hiddenFill xmlns:a14="http://schemas.microsoft.com/office/drawing/2010/main">
                 <a:solidFill>
                   <a:srgbClr val="FFFFFF"/>
                 </a:solidFill>
               </a14:hiddenFill>
             </a:ext>
             <a:ext uri="{91240B29-F687-4F45-9708-019B960494DF}">
-              <a14:hiddenLine xmlns:a14="http://schemas.microsoft.com/office/drawing/2010/main" xmlns="" w="9525">
+              <a14:hiddenLine xmlns:a14="http://schemas.microsoft.com/office/drawing/2010/main" w="9525">
                 <a:solidFill>
                   <a:srgbClr val="000000"/>
                 </a:solidFill>
@@ -1801,11 +1760,7 @@
             </a:pPr>
             <a:r>
               <a:rPr lang="en-NZ" dirty="0" smtClean="0"/>
-              <a:t>In our game, what can change is the choice and production of game characters. So that is what we want to </a:t>
-            </a:r>
-            <a:r>
-              <a:rPr lang="en-NZ" dirty="0" smtClean="0"/>
-              <a:t>encapsulate</a:t>
+              <a:t>In our game, what can change is the choice and production of game characters. So that is what we want to encapsulate</a:t>
             </a:r>
           </a:p>
           <a:p>
@@ -1841,11 +1796,7 @@
             </a:pPr>
             <a:r>
               <a:rPr lang="en-NZ" dirty="0" smtClean="0"/>
-              <a:t>Make it a </a:t>
-            </a:r>
-            <a:r>
-              <a:rPr lang="en-NZ" dirty="0" smtClean="0"/>
-              <a:t>class</a:t>
+              <a:t>Make it a class</a:t>
             </a:r>
           </a:p>
           <a:p>
@@ -1881,11 +1832,7 @@
             </a:pPr>
             <a:r>
               <a:rPr lang="en-NZ" b="1" dirty="0" smtClean="0"/>
-              <a:t>Its sole responsibility is to produce objects according to some rule, and return </a:t>
-            </a:r>
-            <a:r>
-              <a:rPr lang="en-NZ" b="1" dirty="0" smtClean="0"/>
-              <a:t>them</a:t>
+              <a:t>Its sole responsibility is to produce objects according to some rule, and return them</a:t>
             </a:r>
           </a:p>
           <a:p>
@@ -1994,7 +1941,7 @@
     </p:spTree>
     <p:extLst>
       <p:ext uri="{BB962C8B-B14F-4D97-AF65-F5344CB8AC3E}">
-        <p14:creationId xmlns:p14="http://schemas.microsoft.com/office/powerpoint/2010/main" xmlns="" val="2843050606"/>
+        <p14:creationId xmlns:p14="http://schemas.microsoft.com/office/powerpoint/2010/main" val="2843050606"/>
       </p:ext>
     </p:extLst>
   </p:cSld>
@@ -2043,7 +1990,7 @@
           </a:ln>
           <a:extLst>
             <a:ext uri="{909E8E84-426E-40DD-AFC4-6F175D3DCCD1}">
-              <a14:hiddenFill xmlns:a14="http://schemas.microsoft.com/office/drawing/2010/main" xmlns="">
+              <a14:hiddenFill xmlns:a14="http://schemas.microsoft.com/office/drawing/2010/main">
                 <a:solidFill>
                   <a:srgbClr val="FFFFFF"/>
                 </a:solidFill>
@@ -2066,14 +2013,14 @@
           <a:noFill/>
           <a:extLst>
             <a:ext uri="{909E8E84-426E-40DD-AFC4-6F175D3DCCD1}">
-              <a14:hiddenFill xmlns:a14="http://schemas.microsoft.com/office/drawing/2010/main" xmlns="">
+              <a14:hiddenFill xmlns:a14="http://schemas.microsoft.com/office/drawing/2010/main">
                 <a:solidFill>
                   <a:srgbClr val="FFFFFF"/>
                 </a:solidFill>
               </a14:hiddenFill>
             </a:ext>
             <a:ext uri="{91240B29-F687-4F45-9708-019B960494DF}">
-              <a14:hiddenLine xmlns:a14="http://schemas.microsoft.com/office/drawing/2010/main" xmlns="" w="9525">
+              <a14:hiddenLine xmlns:a14="http://schemas.microsoft.com/office/drawing/2010/main" w="9525">
                 <a:solidFill>
                   <a:srgbClr val="000000"/>
                 </a:solidFill>
@@ -2235,7 +2182,7 @@
     </p:spTree>
     <p:extLst>
       <p:ext uri="{BB962C8B-B14F-4D97-AF65-F5344CB8AC3E}">
-        <p14:creationId xmlns:p14="http://schemas.microsoft.com/office/powerpoint/2010/main" xmlns="" val="1883466759"/>
+        <p14:creationId xmlns:p14="http://schemas.microsoft.com/office/powerpoint/2010/main" val="1883466759"/>
       </p:ext>
     </p:extLst>
   </p:cSld>
@@ -2284,7 +2231,7 @@
           </a:ln>
           <a:extLst>
             <a:ext uri="{909E8E84-426E-40DD-AFC4-6F175D3DCCD1}">
-              <a14:hiddenFill xmlns:a14="http://schemas.microsoft.com/office/drawing/2010/main" xmlns="">
+              <a14:hiddenFill xmlns:a14="http://schemas.microsoft.com/office/drawing/2010/main">
                 <a:solidFill>
                   <a:srgbClr val="FFFFFF"/>
                 </a:solidFill>
@@ -2307,14 +2254,14 @@
           <a:noFill/>
           <a:extLst>
             <a:ext uri="{909E8E84-426E-40DD-AFC4-6F175D3DCCD1}">
-              <a14:hiddenFill xmlns:a14="http://schemas.microsoft.com/office/drawing/2010/main" xmlns="">
+              <a14:hiddenFill xmlns:a14="http://schemas.microsoft.com/office/drawing/2010/main">
                 <a:solidFill>
                   <a:srgbClr val="FFFFFF"/>
                 </a:solidFill>
               </a14:hiddenFill>
             </a:ext>
             <a:ext uri="{91240B29-F687-4F45-9708-019B960494DF}">
-              <a14:hiddenLine xmlns:a14="http://schemas.microsoft.com/office/drawing/2010/main" xmlns="" w="9525">
+              <a14:hiddenLine xmlns:a14="http://schemas.microsoft.com/office/drawing/2010/main" w="9525">
                 <a:solidFill>
                   <a:srgbClr val="000000"/>
                 </a:solidFill>
@@ -2401,7 +2348,7 @@
     </p:spTree>
     <p:extLst>
       <p:ext uri="{BB962C8B-B14F-4D97-AF65-F5344CB8AC3E}">
-        <p14:creationId xmlns:p14="http://schemas.microsoft.com/office/powerpoint/2010/main" xmlns="" val="282900943"/>
+        <p14:creationId xmlns:p14="http://schemas.microsoft.com/office/powerpoint/2010/main" val="282900943"/>
       </p:ext>
     </p:extLst>
   </p:cSld>
@@ -2450,7 +2397,7 @@
           </a:ln>
           <a:extLst>
             <a:ext uri="{909E8E84-426E-40DD-AFC4-6F175D3DCCD1}">
-              <a14:hiddenFill xmlns:a14="http://schemas.microsoft.com/office/drawing/2010/main" xmlns="">
+              <a14:hiddenFill xmlns:a14="http://schemas.microsoft.com/office/drawing/2010/main">
                 <a:solidFill>
                   <a:srgbClr val="FFFFFF"/>
                 </a:solidFill>
@@ -2473,14 +2420,14 @@
           <a:noFill/>
           <a:extLst>
             <a:ext uri="{909E8E84-426E-40DD-AFC4-6F175D3DCCD1}">
-              <a14:hiddenFill xmlns:a14="http://schemas.microsoft.com/office/drawing/2010/main" xmlns="">
+              <a14:hiddenFill xmlns:a14="http://schemas.microsoft.com/office/drawing/2010/main">
                 <a:solidFill>
                   <a:srgbClr val="FFFFFF"/>
                 </a:solidFill>
               </a14:hiddenFill>
             </a:ext>
             <a:ext uri="{91240B29-F687-4F45-9708-019B960494DF}">
-              <a14:hiddenLine xmlns:a14="http://schemas.microsoft.com/office/drawing/2010/main" xmlns="" w="9525">
+              <a14:hiddenLine xmlns:a14="http://schemas.microsoft.com/office/drawing/2010/main" w="9525">
                 <a:solidFill>
                   <a:srgbClr val="000000"/>
                 </a:solidFill>
@@ -2582,11 +2529,7 @@
             </a:r>
             <a:r>
               <a:rPr lang="en-NZ" b="1" i="1" dirty="0" smtClean="0"/>
-              <a:t> if you need to add unicorns? </a:t>
-            </a:r>
-            <a:r>
-              <a:rPr lang="en-NZ" b="1" i="1" dirty="0" smtClean="0"/>
-              <a:t>NOTHING </a:t>
+              <a:t> if you need to add unicorns? NOTHING </a:t>
             </a:r>
             <a:r>
               <a:rPr lang="en-NZ" b="0" i="1" dirty="0" smtClean="0"/>
@@ -2813,7 +2756,7 @@
     </p:spTree>
     <p:extLst>
       <p:ext uri="{BB962C8B-B14F-4D97-AF65-F5344CB8AC3E}">
-        <p14:creationId xmlns:p14="http://schemas.microsoft.com/office/powerpoint/2010/main" xmlns="" val="2765365842"/>
+        <p14:creationId xmlns:p14="http://schemas.microsoft.com/office/powerpoint/2010/main" val="2765365842"/>
       </p:ext>
     </p:extLst>
   </p:cSld>
@@ -2862,7 +2805,7 @@
           </a:ln>
           <a:extLst>
             <a:ext uri="{909E8E84-426E-40DD-AFC4-6F175D3DCCD1}">
-              <a14:hiddenFill xmlns:a14="http://schemas.microsoft.com/office/drawing/2010/main" xmlns="">
+              <a14:hiddenFill xmlns:a14="http://schemas.microsoft.com/office/drawing/2010/main">
                 <a:solidFill>
                   <a:srgbClr val="FFFFFF"/>
                 </a:solidFill>
@@ -2885,14 +2828,14 @@
           <a:noFill/>
           <a:extLst>
             <a:ext uri="{909E8E84-426E-40DD-AFC4-6F175D3DCCD1}">
-              <a14:hiddenFill xmlns:a14="http://schemas.microsoft.com/office/drawing/2010/main" xmlns="">
+              <a14:hiddenFill xmlns:a14="http://schemas.microsoft.com/office/drawing/2010/main">
                 <a:solidFill>
                   <a:srgbClr val="FFFFFF"/>
                 </a:solidFill>
               </a14:hiddenFill>
             </a:ext>
             <a:ext uri="{91240B29-F687-4F45-9708-019B960494DF}">
-              <a14:hiddenLine xmlns:a14="http://schemas.microsoft.com/office/drawing/2010/main" xmlns="" w="9525">
+              <a14:hiddenLine xmlns:a14="http://schemas.microsoft.com/office/drawing/2010/main" w="9525">
                 <a:solidFill>
                   <a:srgbClr val="000000"/>
                 </a:solidFill>
@@ -3144,7 +3087,7 @@
     </p:spTree>
     <p:extLst>
       <p:ext uri="{BB962C8B-B14F-4D97-AF65-F5344CB8AC3E}">
-        <p14:creationId xmlns:p14="http://schemas.microsoft.com/office/powerpoint/2010/main" xmlns="" val="1306613435"/>
+        <p14:creationId xmlns:p14="http://schemas.microsoft.com/office/powerpoint/2010/main" val="1306613435"/>
       </p:ext>
     </p:extLst>
   </p:cSld>
@@ -3193,7 +3136,7 @@
           </a:ln>
           <a:extLst>
             <a:ext uri="{909E8E84-426E-40DD-AFC4-6F175D3DCCD1}">
-              <a14:hiddenFill xmlns:a14="http://schemas.microsoft.com/office/drawing/2010/main" xmlns="">
+              <a14:hiddenFill xmlns:a14="http://schemas.microsoft.com/office/drawing/2010/main">
                 <a:solidFill>
                   <a:srgbClr val="FFFFFF"/>
                 </a:solidFill>
@@ -3216,14 +3159,14 @@
           <a:noFill/>
           <a:extLst>
             <a:ext uri="{909E8E84-426E-40DD-AFC4-6F175D3DCCD1}">
-              <a14:hiddenFill xmlns:a14="http://schemas.microsoft.com/office/drawing/2010/main" xmlns="">
+              <a14:hiddenFill xmlns:a14="http://schemas.microsoft.com/office/drawing/2010/main">
                 <a:solidFill>
                   <a:srgbClr val="FFFFFF"/>
                 </a:solidFill>
               </a14:hiddenFill>
             </a:ext>
             <a:ext uri="{91240B29-F687-4F45-9708-019B960494DF}">
-              <a14:hiddenLine xmlns:a14="http://schemas.microsoft.com/office/drawing/2010/main" xmlns="" w="9525">
+              <a14:hiddenLine xmlns:a14="http://schemas.microsoft.com/office/drawing/2010/main" w="9525">
                 <a:solidFill>
                   <a:srgbClr val="000000"/>
                 </a:solidFill>
@@ -3396,7 +3339,7 @@
     </p:spTree>
     <p:extLst>
       <p:ext uri="{BB962C8B-B14F-4D97-AF65-F5344CB8AC3E}">
-        <p14:creationId xmlns:p14="http://schemas.microsoft.com/office/powerpoint/2010/main" xmlns="" val="1467111951"/>
+        <p14:creationId xmlns:p14="http://schemas.microsoft.com/office/powerpoint/2010/main" val="1467111951"/>
       </p:ext>
     </p:extLst>
   </p:cSld>
@@ -3488,11 +3431,7 @@
             </a:pPr>
             <a:r>
               <a:rPr lang="en-NZ" baseline="0" dirty="0" smtClean="0"/>
-              <a:t>For example, you might have a class hierarchy. Each child needs to generate some objects for some common behaviour, but the actual concrete objects needed differs from child to child</a:t>
-            </a:r>
-            <a:r>
-              <a:rPr lang="en-NZ" baseline="0" dirty="0" smtClean="0"/>
-              <a:t>.</a:t>
+              <a:t>For example, you might have a class hierarchy. Each child needs to generate some objects for some common behaviour, but the actual concrete objects needed differs from child to child.</a:t>
             </a:r>
           </a:p>
           <a:p>
@@ -3676,11 +3615,7 @@
             </a:pPr>
             <a:r>
               <a:rPr lang="en-NZ" baseline="0" dirty="0" smtClean="0"/>
-              <a:t>Let’s </a:t>
-            </a:r>
-            <a:r>
-              <a:rPr lang="en-NZ" baseline="0" dirty="0" smtClean="0"/>
-              <a:t>look at an example…</a:t>
+              <a:t>Let’s look at an example…</a:t>
             </a:r>
             <a:endParaRPr lang="en-NZ" dirty="0"/>
           </a:p>
@@ -3718,7 +3653,7 @@
     </p:spTree>
     <p:extLst>
       <p:ext uri="{BB962C8B-B14F-4D97-AF65-F5344CB8AC3E}">
-        <p14:creationId xmlns:p14="http://schemas.microsoft.com/office/powerpoint/2010/main" xmlns="" val="1794190067"/>
+        <p14:creationId xmlns:p14="http://schemas.microsoft.com/office/powerpoint/2010/main" val="1794190067"/>
       </p:ext>
     </p:extLst>
   </p:cSld>
@@ -3767,7 +3702,7 @@
           </a:ln>
           <a:extLst>
             <a:ext uri="{909E8E84-426E-40DD-AFC4-6F175D3DCCD1}">
-              <a14:hiddenFill xmlns:a14="http://schemas.microsoft.com/office/drawing/2010/main" xmlns="">
+              <a14:hiddenFill xmlns:a14="http://schemas.microsoft.com/office/drawing/2010/main">
                 <a:solidFill>
                   <a:srgbClr val="FFFFFF"/>
                 </a:solidFill>
@@ -3790,14 +3725,14 @@
           <a:noFill/>
           <a:extLst>
             <a:ext uri="{909E8E84-426E-40DD-AFC4-6F175D3DCCD1}">
-              <a14:hiddenFill xmlns:a14="http://schemas.microsoft.com/office/drawing/2010/main" xmlns="">
+              <a14:hiddenFill xmlns:a14="http://schemas.microsoft.com/office/drawing/2010/main">
                 <a:solidFill>
                   <a:srgbClr val="FFFFFF"/>
                 </a:solidFill>
               </a14:hiddenFill>
             </a:ext>
             <a:ext uri="{91240B29-F687-4F45-9708-019B960494DF}">
-              <a14:hiddenLine xmlns:a14="http://schemas.microsoft.com/office/drawing/2010/main" xmlns="" w="9525">
+              <a14:hiddenLine xmlns:a14="http://schemas.microsoft.com/office/drawing/2010/main" w="9525">
                 <a:solidFill>
                   <a:srgbClr val="000000"/>
                 </a:solidFill>
@@ -3825,11 +3760,7 @@
             </a:pPr>
             <a:r>
               <a:rPr lang="en-NZ" dirty="0" smtClean="0"/>
-              <a:t>This is a simple </a:t>
-            </a:r>
-            <a:r>
-              <a:rPr lang="en-NZ" dirty="0" smtClean="0"/>
-              <a:t>game</a:t>
+              <a:t>This is a simple game</a:t>
             </a:r>
           </a:p>
           <a:p>
@@ -3865,11 +3796,7 @@
             </a:pPr>
             <a:r>
               <a:rPr lang="en-NZ" dirty="0" smtClean="0"/>
-              <a:t>Game characters hold a string called ‘message’ to </a:t>
-            </a:r>
-            <a:r>
-              <a:rPr lang="en-NZ" dirty="0" smtClean="0"/>
-              <a:t>which</a:t>
+              <a:t>Game characters hold a string called ‘message’ to which</a:t>
             </a:r>
             <a:r>
               <a:rPr lang="en-NZ" baseline="0" dirty="0" smtClean="0"/>
@@ -3877,17 +3804,8 @@
             </a:r>
             <a:r>
               <a:rPr lang="en-NZ" dirty="0" smtClean="0"/>
-              <a:t>. </a:t>
-            </a:r>
-            <a:r>
-              <a:rPr lang="en-NZ" dirty="0" smtClean="0"/>
-              <a:t>For example, witches say ‘I am a </a:t>
-            </a:r>
-            <a:r>
-              <a:rPr lang="en-NZ" dirty="0" smtClean="0"/>
-              <a:t>witch! Cackle!’</a:t>
-            </a:r>
-            <a:endParaRPr lang="en-NZ" dirty="0" smtClean="0"/>
+              <a:t>. For example, witches say ‘I am a witch! Cackle!’</a:t>
+            </a:r>
           </a:p>
           <a:p>
             <a:pPr eaLnBrk="1" hangingPunct="1">
@@ -3911,11 +3829,7 @@
             </a:r>
             <a:r>
               <a:rPr lang="en-NZ" baseline="0" dirty="0" smtClean="0"/>
-              <a:t> control for this</a:t>
-            </a:r>
-            <a:r>
-              <a:rPr lang="en-NZ" baseline="0" dirty="0" smtClean="0"/>
-              <a:t>).</a:t>
+              <a:t> control for this).</a:t>
             </a:r>
           </a:p>
           <a:p>
@@ -3958,11 +3872,7 @@
             </a:r>
             <a:r>
               <a:rPr lang="en-NZ" baseline="0" dirty="0" smtClean="0"/>
-              <a:t> for printing</a:t>
-            </a:r>
-            <a:r>
-              <a:rPr lang="en-NZ" baseline="0" dirty="0" smtClean="0"/>
-              <a:t>.</a:t>
+              <a:t> for printing.</a:t>
             </a:r>
           </a:p>
           <a:p>
@@ -3985,11 +3895,7 @@
             </a:pPr>
             <a:r>
               <a:rPr lang="en-NZ" dirty="0" smtClean="0"/>
-              <a:t>There is a Form class that provides the screen</a:t>
-            </a:r>
-            <a:r>
-              <a:rPr lang="en-NZ" dirty="0" smtClean="0"/>
-              <a:t>.</a:t>
+              <a:t>There is a Form class that provides the screen.</a:t>
             </a:r>
           </a:p>
           <a:p>
@@ -4050,11 +3956,7 @@
             </a:pPr>
             <a:r>
               <a:rPr lang="en-NZ" baseline="0" dirty="0" smtClean="0"/>
-              <a:t>The goal is to get the Goose</a:t>
-            </a:r>
-            <a:r>
-              <a:rPr lang="en-NZ" baseline="0" dirty="0" smtClean="0"/>
-              <a:t>.</a:t>
+              <a:t>The goal is to get the Goose.</a:t>
             </a:r>
           </a:p>
           <a:p>
@@ -4172,7 +4074,7 @@
     </p:spTree>
     <p:extLst>
       <p:ext uri="{BB962C8B-B14F-4D97-AF65-F5344CB8AC3E}">
-        <p14:creationId xmlns:p14="http://schemas.microsoft.com/office/powerpoint/2010/main" xmlns="" val="212275977"/>
+        <p14:creationId xmlns:p14="http://schemas.microsoft.com/office/powerpoint/2010/main" val="212275977"/>
       </p:ext>
     </p:extLst>
   </p:cSld>
@@ -4221,7 +4123,7 @@
           </a:ln>
           <a:extLst>
             <a:ext uri="{909E8E84-426E-40DD-AFC4-6F175D3DCCD1}">
-              <a14:hiddenFill xmlns:a14="http://schemas.microsoft.com/office/drawing/2010/main" xmlns="">
+              <a14:hiddenFill xmlns:a14="http://schemas.microsoft.com/office/drawing/2010/main">
                 <a:solidFill>
                   <a:srgbClr val="FFFFFF"/>
                 </a:solidFill>
@@ -4244,14 +4146,14 @@
           <a:noFill/>
           <a:extLst>
             <a:ext uri="{909E8E84-426E-40DD-AFC4-6F175D3DCCD1}">
-              <a14:hiddenFill xmlns:a14="http://schemas.microsoft.com/office/drawing/2010/main" xmlns="">
+              <a14:hiddenFill xmlns:a14="http://schemas.microsoft.com/office/drawing/2010/main">
                 <a:solidFill>
                   <a:srgbClr val="FFFFFF"/>
                 </a:solidFill>
               </a14:hiddenFill>
             </a:ext>
             <a:ext uri="{91240B29-F687-4F45-9708-019B960494DF}">
-              <a14:hiddenLine xmlns:a14="http://schemas.microsoft.com/office/drawing/2010/main" xmlns="" w="9525">
+              <a14:hiddenLine xmlns:a14="http://schemas.microsoft.com/office/drawing/2010/main" w="9525">
                 <a:solidFill>
                   <a:srgbClr val="000000"/>
                 </a:solidFill>
@@ -4337,7 +4239,7 @@
     </p:spTree>
     <p:extLst>
       <p:ext uri="{BB962C8B-B14F-4D97-AF65-F5344CB8AC3E}">
-        <p14:creationId xmlns:p14="http://schemas.microsoft.com/office/powerpoint/2010/main" xmlns="" val="2346009253"/>
+        <p14:creationId xmlns:p14="http://schemas.microsoft.com/office/powerpoint/2010/main" val="2346009253"/>
       </p:ext>
     </p:extLst>
   </p:cSld>
@@ -4386,7 +4288,7 @@
           </a:ln>
           <a:extLst>
             <a:ext uri="{909E8E84-426E-40DD-AFC4-6F175D3DCCD1}">
-              <a14:hiddenFill xmlns:a14="http://schemas.microsoft.com/office/drawing/2010/main" xmlns="">
+              <a14:hiddenFill xmlns:a14="http://schemas.microsoft.com/office/drawing/2010/main">
                 <a:solidFill>
                   <a:srgbClr val="FFFFFF"/>
                 </a:solidFill>
@@ -4409,14 +4311,14 @@
           <a:noFill/>
           <a:extLst>
             <a:ext uri="{909E8E84-426E-40DD-AFC4-6F175D3DCCD1}">
-              <a14:hiddenFill xmlns:a14="http://schemas.microsoft.com/office/drawing/2010/main" xmlns="">
+              <a14:hiddenFill xmlns:a14="http://schemas.microsoft.com/office/drawing/2010/main">
                 <a:solidFill>
                   <a:srgbClr val="FFFFFF"/>
                 </a:solidFill>
               </a14:hiddenFill>
             </a:ext>
             <a:ext uri="{91240B29-F687-4F45-9708-019B960494DF}">
-              <a14:hiddenLine xmlns:a14="http://schemas.microsoft.com/office/drawing/2010/main" xmlns="" w="9525">
+              <a14:hiddenLine xmlns:a14="http://schemas.microsoft.com/office/drawing/2010/main" w="9525">
                 <a:solidFill>
                   <a:srgbClr val="000000"/>
                 </a:solidFill>
@@ -4461,11 +4363,7 @@
             </a:pPr>
             <a:r>
               <a:rPr lang="en-NZ" dirty="0" smtClean="0"/>
-              <a:t>In North America, we need to create eagles, bison and </a:t>
-            </a:r>
-            <a:r>
-              <a:rPr lang="en-NZ" dirty="0" smtClean="0"/>
-              <a:t>wolves</a:t>
+              <a:t>In North America, we need to create eagles, bison and wolves</a:t>
             </a:r>
           </a:p>
           <a:p>
@@ -4482,11 +4380,7 @@
             </a:pPr>
             <a:r>
               <a:rPr lang="en-NZ" dirty="0" smtClean="0"/>
-              <a:t>The continents </a:t>
-            </a:r>
-            <a:r>
-              <a:rPr lang="en-NZ" dirty="0" smtClean="0"/>
-              <a:t>will have common data and behaviour,</a:t>
+              <a:t>The continents will have common data and behaviour,</a:t>
             </a:r>
             <a:r>
               <a:rPr lang="en-NZ" baseline="0" dirty="0" smtClean="0"/>
@@ -4494,11 +4388,7 @@
             </a:r>
             <a:r>
               <a:rPr lang="en-NZ" dirty="0" smtClean="0"/>
-              <a:t>are </a:t>
-            </a:r>
-            <a:r>
-              <a:rPr lang="en-NZ" dirty="0" smtClean="0"/>
-              <a:t>likely to be descendants of a common base class</a:t>
+              <a:t>are likely to be descendants of a common base class</a:t>
             </a:r>
           </a:p>
           <a:p>
@@ -4508,11 +4398,7 @@
             </a:pPr>
             <a:r>
               <a:rPr lang="en-NZ" dirty="0" smtClean="0"/>
-              <a:t>The animals </a:t>
-            </a:r>
-            <a:r>
-              <a:rPr lang="en-NZ" dirty="0" smtClean="0"/>
-              <a:t>will have common data and behaviour,</a:t>
+              <a:t>The animals will have common data and behaviour,</a:t>
             </a:r>
             <a:r>
               <a:rPr lang="en-NZ" baseline="0" dirty="0" smtClean="0"/>
@@ -4520,15 +4406,7 @@
             </a:r>
             <a:r>
               <a:rPr lang="en-NZ" dirty="0" smtClean="0"/>
-              <a:t>are </a:t>
-            </a:r>
-            <a:r>
-              <a:rPr lang="en-NZ" dirty="0" smtClean="0"/>
-              <a:t>likely to be descendants of another common base </a:t>
-            </a:r>
-            <a:r>
-              <a:rPr lang="en-NZ" dirty="0" smtClean="0"/>
-              <a:t>class</a:t>
+              <a:t>are likely to be descendants of another common base class</a:t>
             </a:r>
           </a:p>
           <a:p>
@@ -4553,11 +4431,7 @@
             </a:r>
             <a:r>
               <a:rPr lang="en-NZ" dirty="0" smtClean="0"/>
-              <a:t>Keeping </a:t>
-            </a:r>
-            <a:r>
-              <a:rPr lang="en-NZ" dirty="0" smtClean="0"/>
-              <a:t>in mind that the purpose of the Factory approach is to </a:t>
+              <a:t>Keeping in mind that the purpose of the Factory approach is to </a:t>
             </a:r>
             <a:r>
               <a:rPr lang="en-NZ" b="1" i="1" dirty="0" smtClean="0"/>
@@ -4606,7 +4480,7 @@
     </p:spTree>
     <p:extLst>
       <p:ext uri="{BB962C8B-B14F-4D97-AF65-F5344CB8AC3E}">
-        <p14:creationId xmlns:p14="http://schemas.microsoft.com/office/powerpoint/2010/main" xmlns="" val="2195144809"/>
+        <p14:creationId xmlns:p14="http://schemas.microsoft.com/office/powerpoint/2010/main" val="2195144809"/>
       </p:ext>
     </p:extLst>
   </p:cSld>
@@ -4655,7 +4529,7 @@
           </a:ln>
           <a:extLst>
             <a:ext uri="{909E8E84-426E-40DD-AFC4-6F175D3DCCD1}">
-              <a14:hiddenFill xmlns:a14="http://schemas.microsoft.com/office/drawing/2010/main" xmlns="">
+              <a14:hiddenFill xmlns:a14="http://schemas.microsoft.com/office/drawing/2010/main">
                 <a:solidFill>
                   <a:srgbClr val="FFFFFF"/>
                 </a:solidFill>
@@ -4678,14 +4552,14 @@
           <a:noFill/>
           <a:extLst>
             <a:ext uri="{909E8E84-426E-40DD-AFC4-6F175D3DCCD1}">
-              <a14:hiddenFill xmlns:a14="http://schemas.microsoft.com/office/drawing/2010/main" xmlns="">
+              <a14:hiddenFill xmlns:a14="http://schemas.microsoft.com/office/drawing/2010/main">
                 <a:solidFill>
                   <a:srgbClr val="FFFFFF"/>
                 </a:solidFill>
               </a14:hiddenFill>
             </a:ext>
             <a:ext uri="{91240B29-F687-4F45-9708-019B960494DF}">
-              <a14:hiddenLine xmlns:a14="http://schemas.microsoft.com/office/drawing/2010/main" xmlns="" w="9525">
+              <a14:hiddenLine xmlns:a14="http://schemas.microsoft.com/office/drawing/2010/main" w="9525">
                 <a:solidFill>
                   <a:srgbClr val="000000"/>
                 </a:solidFill>
@@ -4726,15 +4600,7 @@
             </a:pPr>
             <a:r>
               <a:rPr lang="en-NZ" dirty="0" smtClean="0"/>
-              <a:t>It </a:t>
-            </a:r>
-            <a:r>
-              <a:rPr lang="en-NZ" dirty="0" smtClean="0"/>
-              <a:t>just </a:t>
-            </a:r>
-            <a:r>
-              <a:rPr lang="en-NZ" dirty="0" smtClean="0"/>
-              <a:t>creates three randomly selected animals, then dumps their information out to a </a:t>
+              <a:t>It just creates three randomly selected animals, then dumps their information out to a </a:t>
             </a:r>
             <a:r>
               <a:rPr lang="en-NZ" dirty="0" err="1" smtClean="0"/>
@@ -4823,15 +4689,7 @@
             </a:pPr>
             <a:r>
               <a:rPr lang="en-NZ" dirty="0" smtClean="0"/>
-              <a:t>This </a:t>
-            </a:r>
-            <a:r>
-              <a:rPr lang="en-NZ" dirty="0" smtClean="0"/>
-              <a:t>screen shows two snapshots of a single application – one for the NA button and one for the Australia </a:t>
-            </a:r>
-            <a:r>
-              <a:rPr lang="en-NZ" dirty="0" smtClean="0"/>
-              <a:t>button. </a:t>
+              <a:t>This screen shows two snapshots of a single application – one for the NA button and one for the Australia button. </a:t>
             </a:r>
           </a:p>
           <a:p>
@@ -4916,7 +4774,7 @@
     </p:spTree>
     <p:extLst>
       <p:ext uri="{BB962C8B-B14F-4D97-AF65-F5344CB8AC3E}">
-        <p14:creationId xmlns:p14="http://schemas.microsoft.com/office/powerpoint/2010/main" xmlns="" val="3548300081"/>
+        <p14:creationId xmlns:p14="http://schemas.microsoft.com/office/powerpoint/2010/main" val="3548300081"/>
       </p:ext>
     </p:extLst>
   </p:cSld>
@@ -4965,7 +4823,7 @@
           </a:ln>
           <a:extLst>
             <a:ext uri="{909E8E84-426E-40DD-AFC4-6F175D3DCCD1}">
-              <a14:hiddenFill xmlns:a14="http://schemas.microsoft.com/office/drawing/2010/main" xmlns="">
+              <a14:hiddenFill xmlns:a14="http://schemas.microsoft.com/office/drawing/2010/main">
                 <a:solidFill>
                   <a:srgbClr val="FFFFFF"/>
                 </a:solidFill>
@@ -4988,14 +4846,14 @@
           <a:noFill/>
           <a:extLst>
             <a:ext uri="{909E8E84-426E-40DD-AFC4-6F175D3DCCD1}">
-              <a14:hiddenFill xmlns:a14="http://schemas.microsoft.com/office/drawing/2010/main" xmlns="">
+              <a14:hiddenFill xmlns:a14="http://schemas.microsoft.com/office/drawing/2010/main">
                 <a:solidFill>
                   <a:srgbClr val="FFFFFF"/>
                 </a:solidFill>
               </a14:hiddenFill>
             </a:ext>
             <a:ext uri="{91240B29-F687-4F45-9708-019B960494DF}">
-              <a14:hiddenLine xmlns:a14="http://schemas.microsoft.com/office/drawing/2010/main" xmlns="" w="9525">
+              <a14:hiddenLine xmlns:a14="http://schemas.microsoft.com/office/drawing/2010/main" w="9525">
                 <a:solidFill>
                   <a:srgbClr val="000000"/>
                 </a:solidFill>
@@ -5084,7 +4942,7 @@
     </p:spTree>
     <p:extLst>
       <p:ext uri="{BB962C8B-B14F-4D97-AF65-F5344CB8AC3E}">
-        <p14:creationId xmlns:p14="http://schemas.microsoft.com/office/powerpoint/2010/main" xmlns="" val="2808957555"/>
+        <p14:creationId xmlns:p14="http://schemas.microsoft.com/office/powerpoint/2010/main" val="2808957555"/>
       </p:ext>
     </p:extLst>
   </p:cSld>
@@ -5133,7 +4991,7 @@
           </a:ln>
           <a:extLst>
             <a:ext uri="{909E8E84-426E-40DD-AFC4-6F175D3DCCD1}">
-              <a14:hiddenFill xmlns:a14="http://schemas.microsoft.com/office/drawing/2010/main" xmlns="">
+              <a14:hiddenFill xmlns:a14="http://schemas.microsoft.com/office/drawing/2010/main">
                 <a:solidFill>
                   <a:srgbClr val="FFFFFF"/>
                 </a:solidFill>
@@ -5156,14 +5014,14 @@
           <a:noFill/>
           <a:extLst>
             <a:ext uri="{909E8E84-426E-40DD-AFC4-6F175D3DCCD1}">
-              <a14:hiddenFill xmlns:a14="http://schemas.microsoft.com/office/drawing/2010/main" xmlns="">
+              <a14:hiddenFill xmlns:a14="http://schemas.microsoft.com/office/drawing/2010/main">
                 <a:solidFill>
                   <a:srgbClr val="FFFFFF"/>
                 </a:solidFill>
               </a14:hiddenFill>
             </a:ext>
             <a:ext uri="{91240B29-F687-4F45-9708-019B960494DF}">
-              <a14:hiddenLine xmlns:a14="http://schemas.microsoft.com/office/drawing/2010/main" xmlns="" w="9525">
+              <a14:hiddenLine xmlns:a14="http://schemas.microsoft.com/office/drawing/2010/main" w="9525">
                 <a:solidFill>
                   <a:srgbClr val="000000"/>
                 </a:solidFill>
@@ -5188,11 +5046,7 @@
             </a:pPr>
             <a:r>
               <a:rPr lang="en-NZ" dirty="0" smtClean="0"/>
-              <a:t>…and one of the animals</a:t>
-            </a:r>
-            <a:r>
-              <a:rPr lang="en-NZ" dirty="0" smtClean="0"/>
-              <a:t>.</a:t>
+              <a:t>…and one of the animals.</a:t>
             </a:r>
           </a:p>
           <a:p>
@@ -5254,7 +5108,7 @@
     </p:spTree>
     <p:extLst>
       <p:ext uri="{BB962C8B-B14F-4D97-AF65-F5344CB8AC3E}">
-        <p14:creationId xmlns:p14="http://schemas.microsoft.com/office/powerpoint/2010/main" xmlns="" val="2515330476"/>
+        <p14:creationId xmlns:p14="http://schemas.microsoft.com/office/powerpoint/2010/main" val="2515330476"/>
       </p:ext>
     </p:extLst>
   </p:cSld>
@@ -5303,7 +5157,7 @@
           </a:ln>
           <a:extLst>
             <a:ext uri="{909E8E84-426E-40DD-AFC4-6F175D3DCCD1}">
-              <a14:hiddenFill xmlns:a14="http://schemas.microsoft.com/office/drawing/2010/main" xmlns="">
+              <a14:hiddenFill xmlns:a14="http://schemas.microsoft.com/office/drawing/2010/main">
                 <a:solidFill>
                   <a:srgbClr val="FFFFFF"/>
                 </a:solidFill>
@@ -5326,14 +5180,14 @@
           <a:noFill/>
           <a:extLst>
             <a:ext uri="{909E8E84-426E-40DD-AFC4-6F175D3DCCD1}">
-              <a14:hiddenFill xmlns:a14="http://schemas.microsoft.com/office/drawing/2010/main" xmlns="">
+              <a14:hiddenFill xmlns:a14="http://schemas.microsoft.com/office/drawing/2010/main">
                 <a:solidFill>
                   <a:srgbClr val="FFFFFF"/>
                 </a:solidFill>
               </a14:hiddenFill>
             </a:ext>
             <a:ext uri="{91240B29-F687-4F45-9708-019B960494DF}">
-              <a14:hiddenLine xmlns:a14="http://schemas.microsoft.com/office/drawing/2010/main" xmlns="" w="9525">
+              <a14:hiddenLine xmlns:a14="http://schemas.microsoft.com/office/drawing/2010/main" w="9525">
                 <a:solidFill>
                   <a:srgbClr val="000000"/>
                 </a:solidFill>
@@ -5409,7 +5263,7 @@
     </p:spTree>
     <p:extLst>
       <p:ext uri="{BB962C8B-B14F-4D97-AF65-F5344CB8AC3E}">
-        <p14:creationId xmlns:p14="http://schemas.microsoft.com/office/powerpoint/2010/main" xmlns="" val="763909556"/>
+        <p14:creationId xmlns:p14="http://schemas.microsoft.com/office/powerpoint/2010/main" val="763909556"/>
       </p:ext>
     </p:extLst>
   </p:cSld>
@@ -5458,7 +5312,7 @@
           </a:ln>
           <a:extLst>
             <a:ext uri="{909E8E84-426E-40DD-AFC4-6F175D3DCCD1}">
-              <a14:hiddenFill xmlns:a14="http://schemas.microsoft.com/office/drawing/2010/main" xmlns="">
+              <a14:hiddenFill xmlns:a14="http://schemas.microsoft.com/office/drawing/2010/main">
                 <a:solidFill>
                   <a:srgbClr val="FFFFFF"/>
                 </a:solidFill>
@@ -5481,14 +5335,14 @@
           <a:noFill/>
           <a:extLst>
             <a:ext uri="{909E8E84-426E-40DD-AFC4-6F175D3DCCD1}">
-              <a14:hiddenFill xmlns:a14="http://schemas.microsoft.com/office/drawing/2010/main" xmlns="">
+              <a14:hiddenFill xmlns:a14="http://schemas.microsoft.com/office/drawing/2010/main">
                 <a:solidFill>
                   <a:srgbClr val="FFFFFF"/>
                 </a:solidFill>
               </a14:hiddenFill>
             </a:ext>
             <a:ext uri="{91240B29-F687-4F45-9708-019B960494DF}">
-              <a14:hiddenLine xmlns:a14="http://schemas.microsoft.com/office/drawing/2010/main" xmlns="" w="9525">
+              <a14:hiddenLine xmlns:a14="http://schemas.microsoft.com/office/drawing/2010/main" w="9525">
                 <a:solidFill>
                   <a:srgbClr val="000000"/>
                 </a:solidFill>
@@ -5523,11 +5377,7 @@
             </a:pPr>
             <a:r>
               <a:rPr lang="en-NZ" dirty="0" smtClean="0"/>
-              <a:t>An animal factory is just a method, so we could sensibly make it an </a:t>
-            </a:r>
-            <a:r>
-              <a:rPr lang="en-NZ" dirty="0" smtClean="0"/>
-              <a:t>interface. If you need data or default</a:t>
+              <a:t>An animal factory is just a method, so we could sensibly make it an interface. If you need data or default</a:t>
             </a:r>
             <a:r>
               <a:rPr lang="en-NZ" baseline="0" dirty="0" smtClean="0"/>
@@ -5542,19 +5392,7 @@
             </a:pPr>
             <a:r>
               <a:rPr lang="en-NZ" dirty="0" smtClean="0"/>
-              <a:t>We could then </a:t>
-            </a:r>
-            <a:r>
-              <a:rPr lang="en-NZ" dirty="0" smtClean="0"/>
-              <a:t>declare two </a:t>
-            </a:r>
-            <a:r>
-              <a:rPr lang="en-NZ" dirty="0" smtClean="0"/>
-              <a:t>concrete factories, one for each continent</a:t>
-            </a:r>
-            <a:r>
-              <a:rPr lang="en-NZ" dirty="0" smtClean="0"/>
-              <a:t>.</a:t>
+              <a:t>We could then declare two concrete factories, one for each continent.</a:t>
             </a:r>
           </a:p>
           <a:p>
@@ -5579,11 +5417,7 @@
             </a:pPr>
             <a:r>
               <a:rPr lang="en-NZ" dirty="0" smtClean="0"/>
-              <a:t>Here is the NA one</a:t>
-            </a:r>
-            <a:r>
-              <a:rPr lang="en-NZ" dirty="0" smtClean="0"/>
-              <a:t>. We group all the NA animals together here. </a:t>
+              <a:t>Here is the NA one. We group all the NA animals together here. </a:t>
             </a:r>
           </a:p>
           <a:p>
@@ -5593,11 +5427,7 @@
             </a:pPr>
             <a:r>
               <a:rPr lang="en-NZ" dirty="0" smtClean="0"/>
-              <a:t>What </a:t>
-            </a:r>
-            <a:r>
-              <a:rPr lang="en-NZ" dirty="0" smtClean="0"/>
-              <a:t>would the Australian one look like?</a:t>
+              <a:t>What would the Australian one look like?</a:t>
             </a:r>
           </a:p>
         </p:txBody>
@@ -5634,7 +5464,7 @@
     </p:spTree>
     <p:extLst>
       <p:ext uri="{BB962C8B-B14F-4D97-AF65-F5344CB8AC3E}">
-        <p14:creationId xmlns:p14="http://schemas.microsoft.com/office/powerpoint/2010/main" xmlns="" val="1134407522"/>
+        <p14:creationId xmlns:p14="http://schemas.microsoft.com/office/powerpoint/2010/main" val="1134407522"/>
       </p:ext>
     </p:extLst>
   </p:cSld>
@@ -5683,7 +5513,7 @@
           </a:ln>
           <a:extLst>
             <a:ext uri="{909E8E84-426E-40DD-AFC4-6F175D3DCCD1}">
-              <a14:hiddenFill xmlns:a14="http://schemas.microsoft.com/office/drawing/2010/main" xmlns="">
+              <a14:hiddenFill xmlns:a14="http://schemas.microsoft.com/office/drawing/2010/main">
                 <a:solidFill>
                   <a:srgbClr val="FFFFFF"/>
                 </a:solidFill>
@@ -5706,14 +5536,14 @@
           <a:noFill/>
           <a:extLst>
             <a:ext uri="{909E8E84-426E-40DD-AFC4-6F175D3DCCD1}">
-              <a14:hiddenFill xmlns:a14="http://schemas.microsoft.com/office/drawing/2010/main" xmlns="">
+              <a14:hiddenFill xmlns:a14="http://schemas.microsoft.com/office/drawing/2010/main">
                 <a:solidFill>
                   <a:srgbClr val="FFFFFF"/>
                 </a:solidFill>
               </a14:hiddenFill>
             </a:ext>
             <a:ext uri="{91240B29-F687-4F45-9708-019B960494DF}">
-              <a14:hiddenLine xmlns:a14="http://schemas.microsoft.com/office/drawing/2010/main" xmlns="" w="9525">
+              <a14:hiddenLine xmlns:a14="http://schemas.microsoft.com/office/drawing/2010/main" w="9525">
                 <a:solidFill>
                   <a:srgbClr val="000000"/>
                 </a:solidFill>
@@ -5785,7 +5615,7 @@
     </p:spTree>
     <p:extLst>
       <p:ext uri="{BB962C8B-B14F-4D97-AF65-F5344CB8AC3E}">
-        <p14:creationId xmlns:p14="http://schemas.microsoft.com/office/powerpoint/2010/main" xmlns="" val="2076446265"/>
+        <p14:creationId xmlns:p14="http://schemas.microsoft.com/office/powerpoint/2010/main" val="2076446265"/>
       </p:ext>
     </p:extLst>
   </p:cSld>
@@ -5834,7 +5664,7 @@
           </a:ln>
           <a:extLst>
             <a:ext uri="{909E8E84-426E-40DD-AFC4-6F175D3DCCD1}">
-              <a14:hiddenFill xmlns:a14="http://schemas.microsoft.com/office/drawing/2010/main" xmlns="">
+              <a14:hiddenFill xmlns:a14="http://schemas.microsoft.com/office/drawing/2010/main">
                 <a:solidFill>
                   <a:srgbClr val="FFFFFF"/>
                 </a:solidFill>
@@ -5857,14 +5687,14 @@
           <a:noFill/>
           <a:extLst>
             <a:ext uri="{909E8E84-426E-40DD-AFC4-6F175D3DCCD1}">
-              <a14:hiddenFill xmlns:a14="http://schemas.microsoft.com/office/drawing/2010/main" xmlns="">
+              <a14:hiddenFill xmlns:a14="http://schemas.microsoft.com/office/drawing/2010/main">
                 <a:solidFill>
                   <a:srgbClr val="FFFFFF"/>
                 </a:solidFill>
               </a14:hiddenFill>
             </a:ext>
             <a:ext uri="{91240B29-F687-4F45-9708-019B960494DF}">
-              <a14:hiddenLine xmlns:a14="http://schemas.microsoft.com/office/drawing/2010/main" xmlns="" w="9525">
+              <a14:hiddenLine xmlns:a14="http://schemas.microsoft.com/office/drawing/2010/main" w="9525">
                 <a:solidFill>
                   <a:srgbClr val="000000"/>
                 </a:solidFill>
@@ -5903,11 +5733,7 @@
             </a:r>
             <a:r>
               <a:rPr lang="en-NZ" baseline="0" dirty="0" smtClean="0"/>
-              <a:t> parameters and controls for </a:t>
-            </a:r>
-            <a:r>
-              <a:rPr lang="en-NZ" baseline="0" dirty="0" smtClean="0"/>
-              <a:t>displaying (we allow a little UI coupling here to keep things simple – add an intermediate class to reduce this if you wish).</a:t>
+              <a:t> parameters and controls for displaying (we allow a little UI coupling here to keep things simple – add an intermediate class to reduce this if you wish).</a:t>
             </a:r>
           </a:p>
           <a:p>
@@ -5924,11 +5750,7 @@
             </a:pPr>
             <a:r>
               <a:rPr lang="en-NZ" dirty="0" smtClean="0"/>
-              <a:t>They will also need a factory to use to create their animals</a:t>
-            </a:r>
-            <a:r>
-              <a:rPr lang="en-NZ" dirty="0" smtClean="0"/>
-              <a:t>.</a:t>
+              <a:t>They will also need a factory to use to create their animals.</a:t>
             </a:r>
           </a:p>
           <a:p>
@@ -5983,15 +5805,7 @@
             </a:r>
             <a:r>
               <a:rPr lang="en-NZ" dirty="0" smtClean="0"/>
-              <a:t>The </a:t>
-            </a:r>
-            <a:r>
-              <a:rPr lang="en-NZ" dirty="0" smtClean="0"/>
-              <a:t>one that produces the kind of animals they </a:t>
-            </a:r>
-            <a:r>
-              <a:rPr lang="en-NZ" dirty="0" smtClean="0"/>
-              <a:t>need</a:t>
+              <a:t>The one that produces the kind of animals they need</a:t>
             </a:r>
           </a:p>
           <a:p>
@@ -6008,11 +5822,7 @@
             </a:pPr>
             <a:r>
               <a:rPr lang="en-NZ" dirty="0" smtClean="0"/>
-              <a:t>When do they get their factory object</a:t>
-            </a:r>
-            <a:r>
-              <a:rPr lang="en-NZ" dirty="0" smtClean="0"/>
-              <a:t>? </a:t>
+              <a:t>When do they get their factory object? </a:t>
             </a:r>
             <a:r>
               <a:rPr lang="en-NZ" dirty="0" smtClean="0">
@@ -6022,15 +5832,7 @@
             </a:r>
             <a:r>
               <a:rPr lang="en-NZ" dirty="0" smtClean="0"/>
-              <a:t> </a:t>
-            </a:r>
-            <a:r>
-              <a:rPr lang="en-NZ" dirty="0" smtClean="0"/>
-              <a:t>In their </a:t>
-            </a:r>
-            <a:r>
-              <a:rPr lang="en-NZ" dirty="0" smtClean="0"/>
-              <a:t>constructor</a:t>
+              <a:t> In their constructor</a:t>
             </a:r>
           </a:p>
           <a:p>
@@ -6095,7 +5897,7 @@
     </p:spTree>
     <p:extLst>
       <p:ext uri="{BB962C8B-B14F-4D97-AF65-F5344CB8AC3E}">
-        <p14:creationId xmlns:p14="http://schemas.microsoft.com/office/powerpoint/2010/main" xmlns="" val="1484968272"/>
+        <p14:creationId xmlns:p14="http://schemas.microsoft.com/office/powerpoint/2010/main" val="1484968272"/>
       </p:ext>
     </p:extLst>
   </p:cSld>
@@ -6193,7 +5995,7 @@
     </p:spTree>
     <p:extLst>
       <p:ext uri="{BB962C8B-B14F-4D97-AF65-F5344CB8AC3E}">
-        <p14:creationId xmlns:p14="http://schemas.microsoft.com/office/powerpoint/2010/main" xmlns="" val="4114696771"/>
+        <p14:creationId xmlns:p14="http://schemas.microsoft.com/office/powerpoint/2010/main" val="4114696771"/>
       </p:ext>
     </p:extLst>
   </p:cSld>
@@ -6242,7 +6044,7 @@
           </a:ln>
           <a:extLst>
             <a:ext uri="{909E8E84-426E-40DD-AFC4-6F175D3DCCD1}">
-              <a14:hiddenFill xmlns:a14="http://schemas.microsoft.com/office/drawing/2010/main" xmlns="">
+              <a14:hiddenFill xmlns:a14="http://schemas.microsoft.com/office/drawing/2010/main">
                 <a:solidFill>
                   <a:srgbClr val="FFFFFF"/>
                 </a:solidFill>
@@ -6265,14 +6067,14 @@
           <a:noFill/>
           <a:extLst>
             <a:ext uri="{909E8E84-426E-40DD-AFC4-6F175D3DCCD1}">
-              <a14:hiddenFill xmlns:a14="http://schemas.microsoft.com/office/drawing/2010/main" xmlns="">
+              <a14:hiddenFill xmlns:a14="http://schemas.microsoft.com/office/drawing/2010/main">
                 <a:solidFill>
                   <a:srgbClr val="FFFFFF"/>
                 </a:solidFill>
               </a14:hiddenFill>
             </a:ext>
             <a:ext uri="{91240B29-F687-4F45-9708-019B960494DF}">
-              <a14:hiddenLine xmlns:a14="http://schemas.microsoft.com/office/drawing/2010/main" xmlns="" w="9525">
+              <a14:hiddenLine xmlns:a14="http://schemas.microsoft.com/office/drawing/2010/main" w="9525">
                 <a:solidFill>
                   <a:srgbClr val="000000"/>
                 </a:solidFill>
@@ -6372,7 +6174,7 @@
     </p:spTree>
     <p:extLst>
       <p:ext uri="{BB962C8B-B14F-4D97-AF65-F5344CB8AC3E}">
-        <p14:creationId xmlns:p14="http://schemas.microsoft.com/office/powerpoint/2010/main" xmlns="" val="260742567"/>
+        <p14:creationId xmlns:p14="http://schemas.microsoft.com/office/powerpoint/2010/main" val="260742567"/>
       </p:ext>
     </p:extLst>
   </p:cSld>
@@ -6488,7 +6290,6 @@
               <a:rPr lang="en-NZ" baseline="0" dirty="0" smtClean="0"/>
               <a:t>Isn’t that lovely. Note the complete absence of code duplication.</a:t>
             </a:r>
-            <a:endParaRPr lang="en-NZ" baseline="0" dirty="0" smtClean="0"/>
           </a:p>
           <a:p>
             <a:pPr marL="171673" indent="-171673">
@@ -6542,7 +6343,7 @@
     </p:spTree>
     <p:extLst>
       <p:ext uri="{BB962C8B-B14F-4D97-AF65-F5344CB8AC3E}">
-        <p14:creationId xmlns:p14="http://schemas.microsoft.com/office/powerpoint/2010/main" xmlns="" val="2566564833"/>
+        <p14:creationId xmlns:p14="http://schemas.microsoft.com/office/powerpoint/2010/main" val="2566564833"/>
       </p:ext>
     </p:extLst>
   </p:cSld>
@@ -6591,7 +6392,7 @@
           </a:ln>
           <a:extLst>
             <a:ext uri="{909E8E84-426E-40DD-AFC4-6F175D3DCCD1}">
-              <a14:hiddenFill xmlns:a14="http://schemas.microsoft.com/office/drawing/2010/main" xmlns="">
+              <a14:hiddenFill xmlns:a14="http://schemas.microsoft.com/office/drawing/2010/main">
                 <a:solidFill>
                   <a:srgbClr val="FFFFFF"/>
                 </a:solidFill>
@@ -6614,14 +6415,14 @@
           <a:noFill/>
           <a:extLst>
             <a:ext uri="{909E8E84-426E-40DD-AFC4-6F175D3DCCD1}">
-              <a14:hiddenFill xmlns:a14="http://schemas.microsoft.com/office/drawing/2010/main" xmlns="">
+              <a14:hiddenFill xmlns:a14="http://schemas.microsoft.com/office/drawing/2010/main">
                 <a:solidFill>
                   <a:srgbClr val="FFFFFF"/>
                 </a:solidFill>
               </a14:hiddenFill>
             </a:ext>
             <a:ext uri="{91240B29-F687-4F45-9708-019B960494DF}">
-              <a14:hiddenLine xmlns:a14="http://schemas.microsoft.com/office/drawing/2010/main" xmlns="" w="9525">
+              <a14:hiddenLine xmlns:a14="http://schemas.microsoft.com/office/drawing/2010/main" w="9525">
                 <a:solidFill>
                   <a:srgbClr val="000000"/>
                 </a:solidFill>
@@ -6646,11 +6447,7 @@
             </a:pPr>
             <a:r>
               <a:rPr lang="en-NZ" dirty="0" smtClean="0"/>
-              <a:t>So, what does the concrete continent child class look like</a:t>
-            </a:r>
-            <a:r>
-              <a:rPr lang="en-NZ" dirty="0" smtClean="0"/>
-              <a:t>?</a:t>
+              <a:t>So, what does the concrete continent child class look like?</a:t>
             </a:r>
           </a:p>
           <a:p>
@@ -6685,11 +6482,7 @@
             </a:r>
             <a:r>
               <a:rPr lang="en-NZ" b="1" i="1" dirty="0" smtClean="0"/>
-              <a:t> will create the correct kinds of </a:t>
-            </a:r>
-            <a:r>
-              <a:rPr lang="en-NZ" b="1" i="1" dirty="0" smtClean="0"/>
-              <a:t>animals</a:t>
+              <a:t> will create the correct kinds of animals</a:t>
             </a:r>
           </a:p>
           <a:p>
@@ -6753,7 +6546,7 @@
     </p:spTree>
     <p:extLst>
       <p:ext uri="{BB962C8B-B14F-4D97-AF65-F5344CB8AC3E}">
-        <p14:creationId xmlns:p14="http://schemas.microsoft.com/office/powerpoint/2010/main" xmlns="" val="2640579611"/>
+        <p14:creationId xmlns:p14="http://schemas.microsoft.com/office/powerpoint/2010/main" val="2640579611"/>
       </p:ext>
     </p:extLst>
   </p:cSld>
@@ -6802,7 +6595,7 @@
           </a:ln>
           <a:extLst>
             <a:ext uri="{909E8E84-426E-40DD-AFC4-6F175D3DCCD1}">
-              <a14:hiddenFill xmlns:a14="http://schemas.microsoft.com/office/drawing/2010/main" xmlns="">
+              <a14:hiddenFill xmlns:a14="http://schemas.microsoft.com/office/drawing/2010/main">
                 <a:solidFill>
                   <a:srgbClr val="FFFFFF"/>
                 </a:solidFill>
@@ -6825,14 +6618,14 @@
           <a:noFill/>
           <a:extLst>
             <a:ext uri="{909E8E84-426E-40DD-AFC4-6F175D3DCCD1}">
-              <a14:hiddenFill xmlns:a14="http://schemas.microsoft.com/office/drawing/2010/main" xmlns="">
+              <a14:hiddenFill xmlns:a14="http://schemas.microsoft.com/office/drawing/2010/main">
                 <a:solidFill>
                   <a:srgbClr val="FFFFFF"/>
                 </a:solidFill>
               </a14:hiddenFill>
             </a:ext>
             <a:ext uri="{91240B29-F687-4F45-9708-019B960494DF}">
-              <a14:hiddenLine xmlns:a14="http://schemas.microsoft.com/office/drawing/2010/main" xmlns="" w="9525">
+              <a14:hiddenLine xmlns:a14="http://schemas.microsoft.com/office/drawing/2010/main" w="9525">
                 <a:solidFill>
                   <a:srgbClr val="000000"/>
                 </a:solidFill>
@@ -6889,15 +6682,7 @@
             </a:r>
             <a:r>
               <a:rPr lang="en-NZ" baseline="0" dirty="0" smtClean="0"/>
-              <a:t> </a:t>
-            </a:r>
-            <a:r>
-              <a:rPr lang="en-NZ" baseline="0" dirty="0" smtClean="0"/>
-              <a:t>method</a:t>
-            </a:r>
-            <a:r>
-              <a:rPr lang="en-NZ" baseline="0" dirty="0" smtClean="0"/>
-              <a:t>.</a:t>
+              <a:t> method.</a:t>
             </a:r>
           </a:p>
           <a:p>
@@ -6951,7 +6736,7 @@
     </p:spTree>
     <p:extLst>
       <p:ext uri="{BB962C8B-B14F-4D97-AF65-F5344CB8AC3E}">
-        <p14:creationId xmlns:p14="http://schemas.microsoft.com/office/powerpoint/2010/main" xmlns="" val="1688594148"/>
+        <p14:creationId xmlns:p14="http://schemas.microsoft.com/office/powerpoint/2010/main" val="1688594148"/>
       </p:ext>
     </p:extLst>
   </p:cSld>
@@ -7000,7 +6785,7 @@
           </a:ln>
           <a:extLst>
             <a:ext uri="{909E8E84-426E-40DD-AFC4-6F175D3DCCD1}">
-              <a14:hiddenFill xmlns:a14="http://schemas.microsoft.com/office/drawing/2010/main" xmlns="">
+              <a14:hiddenFill xmlns:a14="http://schemas.microsoft.com/office/drawing/2010/main">
                 <a:solidFill>
                   <a:srgbClr val="FFFFFF"/>
                 </a:solidFill>
@@ -7023,14 +6808,14 @@
           <a:noFill/>
           <a:extLst>
             <a:ext uri="{909E8E84-426E-40DD-AFC4-6F175D3DCCD1}">
-              <a14:hiddenFill xmlns:a14="http://schemas.microsoft.com/office/drawing/2010/main" xmlns="">
+              <a14:hiddenFill xmlns:a14="http://schemas.microsoft.com/office/drawing/2010/main">
                 <a:solidFill>
                   <a:srgbClr val="FFFFFF"/>
                 </a:solidFill>
               </a14:hiddenFill>
             </a:ext>
             <a:ext uri="{91240B29-F687-4F45-9708-019B960494DF}">
-              <a14:hiddenLine xmlns:a14="http://schemas.microsoft.com/office/drawing/2010/main" xmlns="" w="9525">
+              <a14:hiddenLine xmlns:a14="http://schemas.microsoft.com/office/drawing/2010/main" w="9525">
                 <a:solidFill>
                   <a:srgbClr val="000000"/>
                 </a:solidFill>
@@ -7059,11 +6844,7 @@
             </a:pPr>
             <a:r>
               <a:rPr lang="en-NZ" dirty="0" smtClean="0"/>
-              <a:t>The pattern we just made is an example of the “Abstract Factory Pattern</a:t>
-            </a:r>
-            <a:r>
-              <a:rPr lang="en-NZ" dirty="0" smtClean="0"/>
-              <a:t>”</a:t>
+              <a:t>The pattern we just made is an example of the “Abstract Factory Pattern”</a:t>
             </a:r>
           </a:p>
           <a:p>
@@ -7185,11 +6966,7 @@
             </a:pPr>
             <a:r>
               <a:rPr lang="en-NZ" dirty="0" smtClean="0"/>
-              <a:t>The hollow arrows are inheritance, like always</a:t>
-            </a:r>
-            <a:r>
-              <a:rPr lang="en-NZ" dirty="0" smtClean="0"/>
-              <a:t>.</a:t>
+              <a:t>The hollow arrows are inheritance, like always.</a:t>
             </a:r>
           </a:p>
           <a:p>
@@ -7214,7 +6991,6 @@
               <a:rPr lang="en-NZ" dirty="0" smtClean="0"/>
               <a:t>Sometimes, reading the diagram is harder than writing the code…</a:t>
             </a:r>
-            <a:endParaRPr lang="en-NZ" dirty="0" smtClean="0"/>
           </a:p>
           <a:p>
             <a:pPr eaLnBrk="1" hangingPunct="1">
@@ -7240,11 +7016,7 @@
             </a:r>
             <a:r>
               <a:rPr lang="en-NZ" baseline="0" dirty="0" smtClean="0"/>
-              <a:t> or more </a:t>
-            </a:r>
-            <a:r>
-              <a:rPr lang="en-NZ" baseline="0" dirty="0" smtClean="0"/>
-              <a:t>products (In our example, Continents = Client, Animals = Product)</a:t>
+              <a:t> or more products (In our example, Continents = Client, Animals = Product)</a:t>
             </a:r>
           </a:p>
           <a:p>
@@ -7257,15 +7029,7 @@
             </a:pPr>
             <a:r>
               <a:rPr lang="en-NZ" baseline="0" dirty="0" smtClean="0"/>
-              <a:t>Here </a:t>
-            </a:r>
-            <a:r>
-              <a:rPr lang="en-NZ" baseline="0" dirty="0" smtClean="0"/>
-              <a:t>called Products A and B; there could of course be more</a:t>
-            </a:r>
-            <a:r>
-              <a:rPr lang="en-NZ" baseline="0" dirty="0" smtClean="0"/>
-              <a:t>. </a:t>
+              <a:t>Here called Products A and B; there could of course be more. </a:t>
             </a:r>
           </a:p>
           <a:p>
@@ -7343,19 +7107,7 @@
             </a:pPr>
             <a:r>
               <a:rPr lang="en-NZ" b="1" i="1" baseline="0" dirty="0" smtClean="0"/>
-              <a:t>Instead of creating the products </a:t>
-            </a:r>
-            <a:r>
-              <a:rPr lang="en-NZ" b="1" i="1" baseline="0" dirty="0" smtClean="0"/>
-              <a:t>itself by calling new directly, the client uses </a:t>
-            </a:r>
-            <a:r>
-              <a:rPr lang="en-NZ" b="1" i="1" baseline="0" dirty="0" smtClean="0"/>
-              <a:t>a </a:t>
-            </a:r>
-            <a:r>
-              <a:rPr lang="en-NZ" b="1" i="1" baseline="0" dirty="0" smtClean="0"/>
-              <a:t>factory</a:t>
+              <a:t>Instead of creating the products itself by calling new directly, the client uses a factory</a:t>
             </a:r>
             <a:r>
               <a:rPr lang="en-NZ" b="0" i="0" baseline="0" dirty="0" smtClean="0"/>
@@ -7400,11 +7152,7 @@
             </a:pPr>
             <a:r>
               <a:rPr lang="en-NZ" dirty="0" smtClean="0"/>
-              <a:t>In </a:t>
-            </a:r>
-            <a:r>
-              <a:rPr lang="en-NZ" dirty="0" smtClean="0"/>
-              <a:t>practical, we will build several examples using the Abstract Factory Pattern.</a:t>
+              <a:t>In practical, we will build several examples using the Abstract Factory Pattern.</a:t>
             </a:r>
           </a:p>
         </p:txBody>
@@ -7463,7 +7211,7 @@
     </p:spTree>
     <p:extLst>
       <p:ext uri="{BB962C8B-B14F-4D97-AF65-F5344CB8AC3E}">
-        <p14:creationId xmlns:p14="http://schemas.microsoft.com/office/powerpoint/2010/main" xmlns="" val="1134500888"/>
+        <p14:creationId xmlns:p14="http://schemas.microsoft.com/office/powerpoint/2010/main" val="1134500888"/>
       </p:ext>
     </p:extLst>
   </p:cSld>
@@ -7512,7 +7260,7 @@
           </a:ln>
           <a:extLst>
             <a:ext uri="{909E8E84-426E-40DD-AFC4-6F175D3DCCD1}">
-              <a14:hiddenFill xmlns:a14="http://schemas.microsoft.com/office/drawing/2010/main" xmlns="">
+              <a14:hiddenFill xmlns:a14="http://schemas.microsoft.com/office/drawing/2010/main">
                 <a:solidFill>
                   <a:srgbClr val="FFFFFF"/>
                 </a:solidFill>
@@ -7535,14 +7283,14 @@
           <a:noFill/>
           <a:extLst>
             <a:ext uri="{909E8E84-426E-40DD-AFC4-6F175D3DCCD1}">
-              <a14:hiddenFill xmlns:a14="http://schemas.microsoft.com/office/drawing/2010/main" xmlns="">
+              <a14:hiddenFill xmlns:a14="http://schemas.microsoft.com/office/drawing/2010/main">
                 <a:solidFill>
                   <a:srgbClr val="FFFFFF"/>
                 </a:solidFill>
               </a14:hiddenFill>
             </a:ext>
             <a:ext uri="{91240B29-F687-4F45-9708-019B960494DF}">
-              <a14:hiddenLine xmlns:a14="http://schemas.microsoft.com/office/drawing/2010/main" xmlns="" w="9525">
+              <a14:hiddenLine xmlns:a14="http://schemas.microsoft.com/office/drawing/2010/main" w="9525">
                 <a:solidFill>
                   <a:srgbClr val="000000"/>
                 </a:solidFill>
@@ -7657,7 +7405,7 @@
     </p:spTree>
     <p:extLst>
       <p:ext uri="{BB962C8B-B14F-4D97-AF65-F5344CB8AC3E}">
-        <p14:creationId xmlns:p14="http://schemas.microsoft.com/office/powerpoint/2010/main" xmlns="" val="3705981698"/>
+        <p14:creationId xmlns:p14="http://schemas.microsoft.com/office/powerpoint/2010/main" val="3705981698"/>
       </p:ext>
     </p:extLst>
   </p:cSld>
@@ -7747,7 +7495,7 @@
     </p:spTree>
     <p:extLst>
       <p:ext uri="{BB962C8B-B14F-4D97-AF65-F5344CB8AC3E}">
-        <p14:creationId xmlns:p14="http://schemas.microsoft.com/office/powerpoint/2010/main" xmlns="" val="24209551"/>
+        <p14:creationId xmlns:p14="http://schemas.microsoft.com/office/powerpoint/2010/main" val="24209551"/>
       </p:ext>
     </p:extLst>
   </p:cSld>
@@ -7796,7 +7544,7 @@
           </a:ln>
           <a:extLst>
             <a:ext uri="{909E8E84-426E-40DD-AFC4-6F175D3DCCD1}">
-              <a14:hiddenFill xmlns:a14="http://schemas.microsoft.com/office/drawing/2010/main" xmlns="">
+              <a14:hiddenFill xmlns:a14="http://schemas.microsoft.com/office/drawing/2010/main">
                 <a:solidFill>
                   <a:srgbClr val="FFFFFF"/>
                 </a:solidFill>
@@ -7819,14 +7567,14 @@
           <a:noFill/>
           <a:extLst>
             <a:ext uri="{909E8E84-426E-40DD-AFC4-6F175D3DCCD1}">
-              <a14:hiddenFill xmlns:a14="http://schemas.microsoft.com/office/drawing/2010/main" xmlns="">
+              <a14:hiddenFill xmlns:a14="http://schemas.microsoft.com/office/drawing/2010/main">
                 <a:solidFill>
                   <a:srgbClr val="FFFFFF"/>
                 </a:solidFill>
               </a14:hiddenFill>
             </a:ext>
             <a:ext uri="{91240B29-F687-4F45-9708-019B960494DF}">
-              <a14:hiddenLine xmlns:a14="http://schemas.microsoft.com/office/drawing/2010/main" xmlns="" w="9525">
+              <a14:hiddenLine xmlns:a14="http://schemas.microsoft.com/office/drawing/2010/main" w="9525">
                 <a:solidFill>
                   <a:srgbClr val="000000"/>
                 </a:solidFill>
@@ -7854,11 +7602,7 @@
             </a:pPr>
             <a:r>
               <a:rPr lang="en-NZ" dirty="0" smtClean="0"/>
-              <a:t>We </a:t>
-            </a:r>
-            <a:r>
-              <a:rPr lang="en-NZ" dirty="0" smtClean="0"/>
-              <a:t>will see more of the factory pattern in class on Friday.</a:t>
+              <a:t>We will see more of the factory pattern in class on Friday.</a:t>
             </a:r>
           </a:p>
         </p:txBody>
@@ -7917,7 +7661,7 @@
     </p:spTree>
     <p:extLst>
       <p:ext uri="{BB962C8B-B14F-4D97-AF65-F5344CB8AC3E}">
-        <p14:creationId xmlns:p14="http://schemas.microsoft.com/office/powerpoint/2010/main" xmlns="" val="321987697"/>
+        <p14:creationId xmlns:p14="http://schemas.microsoft.com/office/powerpoint/2010/main" val="321987697"/>
       </p:ext>
     </p:extLst>
   </p:cSld>
@@ -7966,7 +7710,7 @@
           </a:ln>
           <a:extLst>
             <a:ext uri="{909E8E84-426E-40DD-AFC4-6F175D3DCCD1}">
-              <a14:hiddenFill xmlns:a14="http://schemas.microsoft.com/office/drawing/2010/main" xmlns="">
+              <a14:hiddenFill xmlns:a14="http://schemas.microsoft.com/office/drawing/2010/main">
                 <a:solidFill>
                   <a:srgbClr val="FFFFFF"/>
                 </a:solidFill>
@@ -7989,14 +7733,14 @@
           <a:noFill/>
           <a:extLst>
             <a:ext uri="{909E8E84-426E-40DD-AFC4-6F175D3DCCD1}">
-              <a14:hiddenFill xmlns:a14="http://schemas.microsoft.com/office/drawing/2010/main" xmlns="">
+              <a14:hiddenFill xmlns:a14="http://schemas.microsoft.com/office/drawing/2010/main">
                 <a:solidFill>
                   <a:srgbClr val="FFFFFF"/>
                 </a:solidFill>
               </a14:hiddenFill>
             </a:ext>
             <a:ext uri="{91240B29-F687-4F45-9708-019B960494DF}">
-              <a14:hiddenLine xmlns:a14="http://schemas.microsoft.com/office/drawing/2010/main" xmlns="" w="9525">
+              <a14:hiddenLine xmlns:a14="http://schemas.microsoft.com/office/drawing/2010/main" w="9525">
                 <a:solidFill>
                   <a:srgbClr val="000000"/>
                 </a:solidFill>
@@ -8041,11 +7785,7 @@
             </a:r>
             <a:r>
               <a:rPr lang="en-NZ" baseline="0" dirty="0" smtClean="0"/>
-              <a:t>, in a real situation there would be lots of stuff going on here, but in this simple example, we’ll just pop some data in </a:t>
-            </a:r>
-            <a:r>
-              <a:rPr lang="en-NZ" baseline="0" dirty="0" smtClean="0"/>
-              <a:t>here.</a:t>
+              <a:t>, in a real situation there would be lots of stuff going on here, but in this simple example, we’ll just pop some data in here.</a:t>
             </a:r>
           </a:p>
           <a:p>
@@ -8073,7 +7813,6 @@
               <a:rPr lang="en-NZ" baseline="0" dirty="0" smtClean="0"/>
               <a:t>Note that the whole abstract/virtual discussion doesn’t apply to constructors. All children should have their own constructors, regardless. Sometimes all that happens is that they call the parent’s constructor (base) but they still have their own.</a:t>
             </a:r>
-            <a:endParaRPr lang="en-NZ" baseline="0" dirty="0" smtClean="0"/>
           </a:p>
           <a:p>
             <a:pPr eaLnBrk="1" hangingPunct="1">
@@ -8145,7 +7884,7 @@
     </p:spTree>
     <p:extLst>
       <p:ext uri="{BB962C8B-B14F-4D97-AF65-F5344CB8AC3E}">
-        <p14:creationId xmlns:p14="http://schemas.microsoft.com/office/powerpoint/2010/main" xmlns="" val="2163446840"/>
+        <p14:creationId xmlns:p14="http://schemas.microsoft.com/office/powerpoint/2010/main" val="2163446840"/>
       </p:ext>
     </p:extLst>
   </p:cSld>
@@ -8194,7 +7933,7 @@
           </a:ln>
           <a:extLst>
             <a:ext uri="{909E8E84-426E-40DD-AFC4-6F175D3DCCD1}">
-              <a14:hiddenFill xmlns:a14="http://schemas.microsoft.com/office/drawing/2010/main" xmlns="">
+              <a14:hiddenFill xmlns:a14="http://schemas.microsoft.com/office/drawing/2010/main">
                 <a:solidFill>
                   <a:srgbClr val="FFFFFF"/>
                 </a:solidFill>
@@ -8217,14 +7956,14 @@
           <a:noFill/>
           <a:extLst>
             <a:ext uri="{909E8E84-426E-40DD-AFC4-6F175D3DCCD1}">
-              <a14:hiddenFill xmlns:a14="http://schemas.microsoft.com/office/drawing/2010/main" xmlns="">
+              <a14:hiddenFill xmlns:a14="http://schemas.microsoft.com/office/drawing/2010/main">
                 <a:solidFill>
                   <a:srgbClr val="FFFFFF"/>
                 </a:solidFill>
               </a14:hiddenFill>
             </a:ext>
             <a:ext uri="{91240B29-F687-4F45-9708-019B960494DF}">
-              <a14:hiddenLine xmlns:a14="http://schemas.microsoft.com/office/drawing/2010/main" xmlns="" w="9525">
+              <a14:hiddenLine xmlns:a14="http://schemas.microsoft.com/office/drawing/2010/main" w="9525">
                 <a:solidFill>
                   <a:srgbClr val="000000"/>
                 </a:solidFill>
@@ -8265,11 +8004,7 @@
             </a:pPr>
             <a:r>
               <a:rPr lang="en-NZ" dirty="0" smtClean="0"/>
-              <a:t>They only need to set up their class-specific data values in a constructor</a:t>
-            </a:r>
-            <a:r>
-              <a:rPr lang="en-NZ" dirty="0" smtClean="0"/>
-              <a:t>.</a:t>
+              <a:t>They only need to set up their class-specific data values in a constructor.</a:t>
             </a:r>
           </a:p>
           <a:p>
@@ -8368,7 +8103,7 @@
     </p:spTree>
     <p:extLst>
       <p:ext uri="{BB962C8B-B14F-4D97-AF65-F5344CB8AC3E}">
-        <p14:creationId xmlns:p14="http://schemas.microsoft.com/office/powerpoint/2010/main" xmlns="" val="1475891049"/>
+        <p14:creationId xmlns:p14="http://schemas.microsoft.com/office/powerpoint/2010/main" val="1475891049"/>
       </p:ext>
     </p:extLst>
   </p:cSld>
@@ -8417,7 +8152,7 @@
           </a:ln>
           <a:extLst>
             <a:ext uri="{909E8E84-426E-40DD-AFC4-6F175D3DCCD1}">
-              <a14:hiddenFill xmlns:a14="http://schemas.microsoft.com/office/drawing/2010/main" xmlns="">
+              <a14:hiddenFill xmlns:a14="http://schemas.microsoft.com/office/drawing/2010/main">
                 <a:solidFill>
                   <a:srgbClr val="FFFFFF"/>
                 </a:solidFill>
@@ -8440,14 +8175,14 @@
           <a:noFill/>
           <a:extLst>
             <a:ext uri="{909E8E84-426E-40DD-AFC4-6F175D3DCCD1}">
-              <a14:hiddenFill xmlns:a14="http://schemas.microsoft.com/office/drawing/2010/main" xmlns="">
+              <a14:hiddenFill xmlns:a14="http://schemas.microsoft.com/office/drawing/2010/main">
                 <a:solidFill>
                   <a:srgbClr val="FFFFFF"/>
                 </a:solidFill>
               </a14:hiddenFill>
             </a:ext>
             <a:ext uri="{91240B29-F687-4F45-9708-019B960494DF}">
-              <a14:hiddenLine xmlns:a14="http://schemas.microsoft.com/office/drawing/2010/main" xmlns="" w="9525">
+              <a14:hiddenLine xmlns:a14="http://schemas.microsoft.com/office/drawing/2010/main" w="9525">
                 <a:solidFill>
                   <a:srgbClr val="000000"/>
                 </a:solidFill>
@@ -8625,13 +8360,8 @@
             </a:r>
             <a:r>
               <a:rPr lang="en-NZ" baseline="0" dirty="0" smtClean="0"/>
-              <a:t> random </a:t>
-            </a:r>
-            <a:r>
-              <a:rPr lang="en-NZ" baseline="0" dirty="0" smtClean="0"/>
-              <a:t>assignment and shuffling.</a:t>
-            </a:r>
-            <a:endParaRPr lang="en-NZ" baseline="0" dirty="0" smtClean="0"/>
+              <a:t> random assignment and shuffling.</a:t>
+            </a:r>
           </a:p>
           <a:p>
             <a:pPr eaLnBrk="1" hangingPunct="1">
@@ -8712,7 +8442,7 @@
     </p:spTree>
     <p:extLst>
       <p:ext uri="{BB962C8B-B14F-4D97-AF65-F5344CB8AC3E}">
-        <p14:creationId xmlns:p14="http://schemas.microsoft.com/office/powerpoint/2010/main" xmlns="" val="3207062324"/>
+        <p14:creationId xmlns:p14="http://schemas.microsoft.com/office/powerpoint/2010/main" val="3207062324"/>
       </p:ext>
     </p:extLst>
   </p:cSld>
@@ -8814,7 +8544,7 @@
     </p:spTree>
     <p:extLst>
       <p:ext uri="{BB962C8B-B14F-4D97-AF65-F5344CB8AC3E}">
-        <p14:creationId xmlns:p14="http://schemas.microsoft.com/office/powerpoint/2010/main" xmlns="" val="2869706831"/>
+        <p14:creationId xmlns:p14="http://schemas.microsoft.com/office/powerpoint/2010/main" val="2869706831"/>
       </p:ext>
     </p:extLst>
   </p:cSld>
@@ -8908,7 +8638,7 @@
     </p:spTree>
     <p:extLst>
       <p:ext uri="{BB962C8B-B14F-4D97-AF65-F5344CB8AC3E}">
-        <p14:creationId xmlns:p14="http://schemas.microsoft.com/office/powerpoint/2010/main" xmlns="" val="1677018993"/>
+        <p14:creationId xmlns:p14="http://schemas.microsoft.com/office/powerpoint/2010/main" val="1677018993"/>
       </p:ext>
     </p:extLst>
   </p:cSld>
@@ -8977,11 +8707,7 @@
             </a:r>
             <a:r>
               <a:rPr lang="en-NZ" baseline="0" dirty="0" smtClean="0"/>
-              <a:t> at how we put the characters into the </a:t>
-            </a:r>
-            <a:r>
-              <a:rPr lang="en-NZ" baseline="0" dirty="0" smtClean="0"/>
-              <a:t>list.</a:t>
+              <a:t> at how we put the characters into the list.</a:t>
             </a:r>
             <a:endParaRPr lang="en-NZ" dirty="0"/>
           </a:p>
@@ -9019,7 +8745,7 @@
     </p:spTree>
     <p:extLst>
       <p:ext uri="{BB962C8B-B14F-4D97-AF65-F5344CB8AC3E}">
-        <p14:creationId xmlns:p14="http://schemas.microsoft.com/office/powerpoint/2010/main" xmlns="" val="4140309587"/>
+        <p14:creationId xmlns:p14="http://schemas.microsoft.com/office/powerpoint/2010/main" val="4140309587"/>
       </p:ext>
     </p:extLst>
   </p:cSld>
@@ -9223,7 +8949,7 @@
               <a:pPr>
                 <a:defRPr/>
               </a:pPr>
-              <a:t>3/12/2016</a:t>
+              <a:t>3/15/2016</a:t>
             </a:fld>
             <a:endParaRPr lang="en-US"/>
           </a:p>
@@ -9438,7 +9164,7 @@
               <a:pPr>
                 <a:defRPr/>
               </a:pPr>
-              <a:t>3/12/2016</a:t>
+              <a:t>3/15/2016</a:t>
             </a:fld>
             <a:endParaRPr lang="en-US"/>
           </a:p>
@@ -9628,7 +9354,7 @@
               <a:pPr>
                 <a:defRPr/>
               </a:pPr>
-              <a:t>3/12/2016</a:t>
+              <a:t>3/15/2016</a:t>
             </a:fld>
             <a:endParaRPr lang="en-US"/>
           </a:p>
@@ -9818,7 +9544,7 @@
               <a:pPr>
                 <a:defRPr/>
               </a:pPr>
-              <a:t>3/12/2016</a:t>
+              <a:t>3/15/2016</a:t>
             </a:fld>
             <a:endParaRPr lang="en-US"/>
           </a:p>
@@ -10081,7 +9807,7 @@
               <a:pPr>
                 <a:defRPr/>
               </a:pPr>
-              <a:t>3/12/2016</a:t>
+              <a:t>3/15/2016</a:t>
             </a:fld>
             <a:endParaRPr lang="en-US"/>
           </a:p>
@@ -10414,7 +10140,7 @@
               <a:pPr>
                 <a:defRPr/>
               </a:pPr>
-              <a:t>3/12/2016</a:t>
+              <a:t>3/15/2016</a:t>
             </a:fld>
             <a:endParaRPr lang="en-US"/>
           </a:p>
@@ -10895,7 +10621,7 @@
               <a:pPr>
                 <a:defRPr/>
               </a:pPr>
-              <a:t>3/12/2016</a:t>
+              <a:t>3/15/2016</a:t>
             </a:fld>
             <a:endParaRPr lang="en-US"/>
           </a:p>
@@ -11058,7 +10784,7 @@
               <a:pPr>
                 <a:defRPr/>
               </a:pPr>
-              <a:t>3/12/2016</a:t>
+              <a:t>3/15/2016</a:t>
             </a:fld>
             <a:endParaRPr lang="en-US"/>
           </a:p>
@@ -11163,7 +10889,7 @@
               <a:pPr>
                 <a:defRPr/>
               </a:pPr>
-              <a:t>3/12/2016</a:t>
+              <a:t>3/15/2016</a:t>
             </a:fld>
             <a:endParaRPr lang="en-US"/>
           </a:p>
@@ -11452,7 +11178,7 @@
               <a:pPr>
                 <a:defRPr/>
               </a:pPr>
-              <a:t>3/12/2016</a:t>
+              <a:t>3/15/2016</a:t>
             </a:fld>
             <a:endParaRPr lang="en-US"/>
           </a:p>
@@ -11772,7 +11498,7 @@
               <a:pPr>
                 <a:defRPr/>
               </a:pPr>
-              <a:t>3/12/2016</a:t>
+              <a:t>3/15/2016</a:t>
             </a:fld>
             <a:endParaRPr lang="en-US"/>
           </a:p>
@@ -12085,7 +11811,7 @@
               <a:pPr>
                 <a:defRPr/>
               </a:pPr>
-              <a:t>3/12/2016</a:t>
+              <a:t>3/15/2016</a:t>
             </a:fld>
             <a:endParaRPr lang="en-US"/>
           </a:p>
@@ -12646,7 +12372,7 @@
     </p:spTree>
     <p:extLst>
       <p:ext uri="{BB962C8B-B14F-4D97-AF65-F5344CB8AC3E}">
-        <p14:creationId xmlns:p14="http://schemas.microsoft.com/office/powerpoint/2010/main" xmlns="" val="2793554808"/>
+        <p14:creationId xmlns:p14="http://schemas.microsoft.com/office/powerpoint/2010/main" val="2793554808"/>
       </p:ext>
     </p:extLst>
   </p:cSld>
@@ -12715,7 +12441,7 @@
           <a:blip r:embed="rId3" cstate="print">
             <a:extLst>
               <a:ext uri="{28A0092B-C50C-407E-A947-70E740481C1C}">
-                <a14:useLocalDpi xmlns:a14="http://schemas.microsoft.com/office/drawing/2010/main" xmlns="" val="0"/>
+                <a14:useLocalDpi xmlns:a14="http://schemas.microsoft.com/office/drawing/2010/main" val="0"/>
               </a:ext>
             </a:extLst>
           </a:blip>
@@ -12738,14 +12464,14 @@
           </a:ln>
           <a:extLst>
             <a:ext uri="{909E8E84-426E-40DD-AFC4-6F175D3DCCD1}">
-              <a14:hiddenFill xmlns:a14="http://schemas.microsoft.com/office/drawing/2010/main" xmlns="">
+              <a14:hiddenFill xmlns:a14="http://schemas.microsoft.com/office/drawing/2010/main">
                 <a:solidFill>
                   <a:schemeClr val="accent1"/>
                 </a:solidFill>
               </a14:hiddenFill>
             </a:ext>
             <a:ext uri="{91240B29-F687-4F45-9708-019B960494DF}">
-              <a14:hiddenLine xmlns:a14="http://schemas.microsoft.com/office/drawing/2010/main" xmlns="" w="9525">
+              <a14:hiddenLine xmlns:a14="http://schemas.microsoft.com/office/drawing/2010/main" w="9525">
                 <a:solidFill>
                   <a:schemeClr val="tx1"/>
                 </a:solidFill>
@@ -12769,7 +12495,7 @@
           <a:blip r:embed="rId4" cstate="print">
             <a:extLst>
               <a:ext uri="{28A0092B-C50C-407E-A947-70E740481C1C}">
-                <a14:useLocalDpi xmlns:a14="http://schemas.microsoft.com/office/drawing/2010/main" xmlns="" val="0"/>
+                <a14:useLocalDpi xmlns:a14="http://schemas.microsoft.com/office/drawing/2010/main" val="0"/>
               </a:ext>
             </a:extLst>
           </a:blip>
@@ -12792,14 +12518,14 @@
           </a:ln>
           <a:extLst>
             <a:ext uri="{909E8E84-426E-40DD-AFC4-6F175D3DCCD1}">
-              <a14:hiddenFill xmlns:a14="http://schemas.microsoft.com/office/drawing/2010/main" xmlns="">
+              <a14:hiddenFill xmlns:a14="http://schemas.microsoft.com/office/drawing/2010/main">
                 <a:solidFill>
                   <a:schemeClr val="accent1"/>
                 </a:solidFill>
               </a14:hiddenFill>
             </a:ext>
             <a:ext uri="{91240B29-F687-4F45-9708-019B960494DF}">
-              <a14:hiddenLine xmlns:a14="http://schemas.microsoft.com/office/drawing/2010/main" xmlns="" w="9525">
+              <a14:hiddenLine xmlns:a14="http://schemas.microsoft.com/office/drawing/2010/main" w="9525">
                 <a:solidFill>
                   <a:schemeClr val="tx1"/>
                 </a:solidFill>
@@ -13025,7 +12751,7 @@
     </p:spTree>
     <p:extLst>
       <p:ext uri="{BB962C8B-B14F-4D97-AF65-F5344CB8AC3E}">
-        <p14:creationId xmlns:p14="http://schemas.microsoft.com/office/powerpoint/2010/main" xmlns="" val="824639734"/>
+        <p14:creationId xmlns:p14="http://schemas.microsoft.com/office/powerpoint/2010/main" val="824639734"/>
       </p:ext>
     </p:extLst>
   </p:cSld>
@@ -13362,14 +13088,14 @@
           </a:ln>
           <a:extLst>
             <a:ext uri="{909E8E84-426E-40DD-AFC4-6F175D3DCCD1}">
-              <a14:hiddenFill xmlns:a14="http://schemas.microsoft.com/office/drawing/2010/main" xmlns="">
+              <a14:hiddenFill xmlns:a14="http://schemas.microsoft.com/office/drawing/2010/main">
                 <a:solidFill>
                   <a:srgbClr val="FFFFFF"/>
                 </a:solidFill>
               </a14:hiddenFill>
             </a:ext>
             <a:ext uri="{91240B29-F687-4F45-9708-019B960494DF}">
-              <a14:hiddenLine xmlns:a14="http://schemas.microsoft.com/office/drawing/2010/main" xmlns="" w="9525">
+              <a14:hiddenLine xmlns:a14="http://schemas.microsoft.com/office/drawing/2010/main" w="9525">
                 <a:solidFill>
                   <a:srgbClr val="000000"/>
                 </a:solidFill>
@@ -13515,14 +13241,14 @@
           </a:ln>
           <a:extLst>
             <a:ext uri="{909E8E84-426E-40DD-AFC4-6F175D3DCCD1}">
-              <a14:hiddenFill xmlns:a14="http://schemas.microsoft.com/office/drawing/2010/main" xmlns="">
+              <a14:hiddenFill xmlns:a14="http://schemas.microsoft.com/office/drawing/2010/main">
                 <a:solidFill>
                   <a:srgbClr val="FFFFFF"/>
                 </a:solidFill>
               </a14:hiddenFill>
             </a:ext>
             <a:ext uri="{91240B29-F687-4F45-9708-019B960494DF}">
-              <a14:hiddenLine xmlns:a14="http://schemas.microsoft.com/office/drawing/2010/main" xmlns="" w="9525">
+              <a14:hiddenLine xmlns:a14="http://schemas.microsoft.com/office/drawing/2010/main" w="9525">
                 <a:solidFill>
                   <a:srgbClr val="000000"/>
                 </a:solidFill>
@@ -13747,14 +13473,14 @@
           </a:ln>
           <a:extLst>
             <a:ext uri="{909E8E84-426E-40DD-AFC4-6F175D3DCCD1}">
-              <a14:hiddenFill xmlns:a14="http://schemas.microsoft.com/office/drawing/2010/main" xmlns="">
+              <a14:hiddenFill xmlns:a14="http://schemas.microsoft.com/office/drawing/2010/main">
                 <a:solidFill>
                   <a:srgbClr val="FFFFFF"/>
                 </a:solidFill>
               </a14:hiddenFill>
             </a:ext>
             <a:ext uri="{91240B29-F687-4F45-9708-019B960494DF}">
-              <a14:hiddenLine xmlns:a14="http://schemas.microsoft.com/office/drawing/2010/main" xmlns="" w="9525">
+              <a14:hiddenLine xmlns:a14="http://schemas.microsoft.com/office/drawing/2010/main" w="9525">
                 <a:solidFill>
                   <a:srgbClr val="000000"/>
                 </a:solidFill>
@@ -14986,7 +14712,7 @@
           <a:blip r:embed="rId3" cstate="print">
             <a:extLst>
               <a:ext uri="{28A0092B-C50C-407E-A947-70E740481C1C}">
-                <a14:useLocalDpi xmlns:a14="http://schemas.microsoft.com/office/drawing/2010/main" xmlns="" val="0"/>
+                <a14:useLocalDpi xmlns:a14="http://schemas.microsoft.com/office/drawing/2010/main" val="0"/>
               </a:ext>
             </a:extLst>
           </a:blip>
@@ -15010,14 +14736,14 @@
           <a:effectLst/>
           <a:extLst>
             <a:ext uri="{909E8E84-426E-40DD-AFC4-6F175D3DCCD1}">
-              <a14:hiddenFill xmlns:a14="http://schemas.microsoft.com/office/drawing/2010/main" xmlns="">
+              <a14:hiddenFill xmlns:a14="http://schemas.microsoft.com/office/drawing/2010/main">
                 <a:solidFill>
                   <a:schemeClr val="accent1"/>
                 </a:solidFill>
               </a14:hiddenFill>
             </a:ext>
             <a:ext uri="{91240B29-F687-4F45-9708-019B960494DF}">
-              <a14:hiddenLine xmlns:a14="http://schemas.microsoft.com/office/drawing/2010/main" xmlns="" w="9525">
+              <a14:hiddenLine xmlns:a14="http://schemas.microsoft.com/office/drawing/2010/main" w="9525">
                 <a:solidFill>
                   <a:schemeClr val="tx1"/>
                 </a:solidFill>
@@ -15027,7 +14753,7 @@
               </a14:hiddenLine>
             </a:ext>
             <a:ext uri="{AF507438-7753-43E0-B8FC-AC1667EBCBE1}">
-              <a14:hiddenEffects xmlns:a14="http://schemas.microsoft.com/office/drawing/2010/main" xmlns="">
+              <a14:hiddenEffects xmlns:a14="http://schemas.microsoft.com/office/drawing/2010/main">
                 <a:effectLst>
                   <a:outerShdw dist="35921" dir="2700000" algn="ctr" rotWithShape="0">
                     <a:schemeClr val="bg2"/>
@@ -15218,23 +14944,7 @@
                   <a:schemeClr val="tx1"/>
                 </a:solidFill>
               </a:rPr>
-              <a:t>Child Class 1: needs concrete </a:t>
-            </a:r>
-            <a:r>
-              <a:rPr lang="en-NZ" dirty="0" smtClean="0">
-                <a:solidFill>
-                  <a:schemeClr val="tx1"/>
-                </a:solidFill>
-              </a:rPr>
-              <a:t>objects from Set </a:t>
-            </a:r>
-            <a:r>
-              <a:rPr lang="en-NZ" dirty="0" smtClean="0">
-                <a:solidFill>
-                  <a:schemeClr val="tx1"/>
-                </a:solidFill>
-              </a:rPr>
-              <a:t>1</a:t>
+              <a:t>Child Class 1: needs concrete objects from Set 1</a:t>
             </a:r>
             <a:endParaRPr lang="en-NZ" dirty="0">
               <a:solidFill>
@@ -15289,23 +14999,7 @@
                   <a:schemeClr val="tx1"/>
                 </a:solidFill>
               </a:rPr>
-              <a:t>Child Class 2 needs concrete </a:t>
-            </a:r>
-            <a:r>
-              <a:rPr lang="en-NZ" dirty="0" smtClean="0">
-                <a:solidFill>
-                  <a:schemeClr val="tx1"/>
-                </a:solidFill>
-              </a:rPr>
-              <a:t>objects from Set </a:t>
-            </a:r>
-            <a:r>
-              <a:rPr lang="en-NZ" dirty="0" smtClean="0">
-                <a:solidFill>
-                  <a:schemeClr val="tx1"/>
-                </a:solidFill>
-              </a:rPr>
-              <a:t>2</a:t>
+              <a:t>Child Class 2 needs concrete objects from Set 2</a:t>
             </a:r>
             <a:endParaRPr lang="en-NZ" dirty="0">
               <a:solidFill>
@@ -15360,23 +15054,7 @@
                   <a:schemeClr val="tx1"/>
                 </a:solidFill>
               </a:rPr>
-              <a:t>Child Class n: needs concrete </a:t>
-            </a:r>
-            <a:r>
-              <a:rPr lang="en-NZ" dirty="0" smtClean="0">
-                <a:solidFill>
-                  <a:schemeClr val="tx1"/>
-                </a:solidFill>
-              </a:rPr>
-              <a:t>objects from Set </a:t>
-            </a:r>
-            <a:r>
-              <a:rPr lang="en-NZ" dirty="0" smtClean="0">
-                <a:solidFill>
-                  <a:schemeClr val="tx1"/>
-                </a:solidFill>
-              </a:rPr>
-              <a:t>n</a:t>
+              <a:t>Child Class n: needs concrete objects from Set n</a:t>
             </a:r>
             <a:endParaRPr lang="en-NZ" dirty="0">
               <a:solidFill>
@@ -15967,7 +15645,7 @@
           <a:blip r:embed="rId3" cstate="print">
             <a:extLst>
               <a:ext uri="{28A0092B-C50C-407E-A947-70E740481C1C}">
-                <a14:useLocalDpi xmlns:a14="http://schemas.microsoft.com/office/drawing/2010/main" xmlns="" val="0"/>
+                <a14:useLocalDpi xmlns:a14="http://schemas.microsoft.com/office/drawing/2010/main" val="0"/>
               </a:ext>
             </a:extLst>
           </a:blip>
@@ -15990,14 +15668,14 @@
           </a:ln>
           <a:extLst>
             <a:ext uri="{909E8E84-426E-40DD-AFC4-6F175D3DCCD1}">
-              <a14:hiddenFill xmlns:a14="http://schemas.microsoft.com/office/drawing/2010/main" xmlns="">
+              <a14:hiddenFill xmlns:a14="http://schemas.microsoft.com/office/drawing/2010/main">
                 <a:solidFill>
                   <a:schemeClr val="accent1"/>
                 </a:solidFill>
               </a14:hiddenFill>
             </a:ext>
             <a:ext uri="{91240B29-F687-4F45-9708-019B960494DF}">
-              <a14:hiddenLine xmlns:a14="http://schemas.microsoft.com/office/drawing/2010/main" xmlns="" w="9525">
+              <a14:hiddenLine xmlns:a14="http://schemas.microsoft.com/office/drawing/2010/main" w="9525">
                 <a:solidFill>
                   <a:schemeClr val="tx1"/>
                 </a:solidFill>
@@ -16096,7 +15774,7 @@
           <a:blip r:embed="rId3" cstate="print">
             <a:extLst>
               <a:ext uri="{28A0092B-C50C-407E-A947-70E740481C1C}">
-                <a14:useLocalDpi xmlns:a14="http://schemas.microsoft.com/office/drawing/2010/main" xmlns="" val="0"/>
+                <a14:useLocalDpi xmlns:a14="http://schemas.microsoft.com/office/drawing/2010/main" val="0"/>
               </a:ext>
             </a:extLst>
           </a:blip>
@@ -16119,14 +15797,14 @@
           </a:ln>
           <a:extLst>
             <a:ext uri="{909E8E84-426E-40DD-AFC4-6F175D3DCCD1}">
-              <a14:hiddenFill xmlns:a14="http://schemas.microsoft.com/office/drawing/2010/main" xmlns="">
+              <a14:hiddenFill xmlns:a14="http://schemas.microsoft.com/office/drawing/2010/main">
                 <a:solidFill>
                   <a:srgbClr val="FFFFFF"/>
                 </a:solidFill>
               </a14:hiddenFill>
             </a:ext>
             <a:ext uri="{91240B29-F687-4F45-9708-019B960494DF}">
-              <a14:hiddenLine xmlns:a14="http://schemas.microsoft.com/office/drawing/2010/main" xmlns="" w="9525">
+              <a14:hiddenLine xmlns:a14="http://schemas.microsoft.com/office/drawing/2010/main" w="9525">
                 <a:solidFill>
                   <a:srgbClr val="000000"/>
                 </a:solidFill>
@@ -16150,7 +15828,7 @@
           <a:blip r:embed="rId4" cstate="print">
             <a:extLst>
               <a:ext uri="{28A0092B-C50C-407E-A947-70E740481C1C}">
-                <a14:useLocalDpi xmlns:a14="http://schemas.microsoft.com/office/drawing/2010/main" xmlns="" val="0"/>
+                <a14:useLocalDpi xmlns:a14="http://schemas.microsoft.com/office/drawing/2010/main" val="0"/>
               </a:ext>
             </a:extLst>
           </a:blip>
@@ -16173,14 +15851,14 @@
           </a:ln>
           <a:extLst>
             <a:ext uri="{909E8E84-426E-40DD-AFC4-6F175D3DCCD1}">
-              <a14:hiddenFill xmlns:a14="http://schemas.microsoft.com/office/drawing/2010/main" xmlns="">
+              <a14:hiddenFill xmlns:a14="http://schemas.microsoft.com/office/drawing/2010/main">
                 <a:solidFill>
                   <a:srgbClr val="FFFFFF"/>
                 </a:solidFill>
               </a14:hiddenFill>
             </a:ext>
             <a:ext uri="{91240B29-F687-4F45-9708-019B960494DF}">
-              <a14:hiddenLine xmlns:a14="http://schemas.microsoft.com/office/drawing/2010/main" xmlns="" w="9525">
+              <a14:hiddenLine xmlns:a14="http://schemas.microsoft.com/office/drawing/2010/main" w="9525">
                 <a:solidFill>
                   <a:srgbClr val="000000"/>
                 </a:solidFill>
@@ -16261,7 +15939,7 @@
           <a:blip r:embed="rId3" cstate="print">
             <a:extLst>
               <a:ext uri="{28A0092B-C50C-407E-A947-70E740481C1C}">
-                <a14:useLocalDpi xmlns:a14="http://schemas.microsoft.com/office/drawing/2010/main" xmlns="" val="0"/>
+                <a14:useLocalDpi xmlns:a14="http://schemas.microsoft.com/office/drawing/2010/main" val="0"/>
               </a:ext>
             </a:extLst>
           </a:blip>
@@ -16288,7 +15966,7 @@
           <a:blip r:embed="rId4" cstate="print">
             <a:extLst>
               <a:ext uri="{28A0092B-C50C-407E-A947-70E740481C1C}">
-                <a14:useLocalDpi xmlns:a14="http://schemas.microsoft.com/office/drawing/2010/main" xmlns="" val="0"/>
+                <a14:useLocalDpi xmlns:a14="http://schemas.microsoft.com/office/drawing/2010/main" val="0"/>
               </a:ext>
             </a:extLst>
           </a:blip>
@@ -16311,14 +15989,14 @@
           </a:ln>
           <a:extLst>
             <a:ext uri="{909E8E84-426E-40DD-AFC4-6F175D3DCCD1}">
-              <a14:hiddenFill xmlns:a14="http://schemas.microsoft.com/office/drawing/2010/main" xmlns="">
+              <a14:hiddenFill xmlns:a14="http://schemas.microsoft.com/office/drawing/2010/main">
                 <a:solidFill>
                   <a:srgbClr val="FFFFFF"/>
                 </a:solidFill>
               </a14:hiddenFill>
             </a:ext>
             <a:ext uri="{91240B29-F687-4F45-9708-019B960494DF}">
-              <a14:hiddenLine xmlns:a14="http://schemas.microsoft.com/office/drawing/2010/main" xmlns="" w="9525">
+              <a14:hiddenLine xmlns:a14="http://schemas.microsoft.com/office/drawing/2010/main" w="9525">
                 <a:solidFill>
                   <a:srgbClr val="000000"/>
                 </a:solidFill>
@@ -16342,7 +16020,7 @@
           <a:blip r:embed="rId5" cstate="print">
             <a:extLst>
               <a:ext uri="{28A0092B-C50C-407E-A947-70E740481C1C}">
-                <a14:useLocalDpi xmlns:a14="http://schemas.microsoft.com/office/drawing/2010/main" xmlns="" val="0"/>
+                <a14:useLocalDpi xmlns:a14="http://schemas.microsoft.com/office/drawing/2010/main" val="0"/>
               </a:ext>
             </a:extLst>
           </a:blip>
@@ -16365,14 +16043,14 @@
           </a:ln>
           <a:extLst>
             <a:ext uri="{909E8E84-426E-40DD-AFC4-6F175D3DCCD1}">
-              <a14:hiddenFill xmlns:a14="http://schemas.microsoft.com/office/drawing/2010/main" xmlns="">
+              <a14:hiddenFill xmlns:a14="http://schemas.microsoft.com/office/drawing/2010/main">
                 <a:solidFill>
                   <a:srgbClr val="FFFFFF"/>
                 </a:solidFill>
               </a14:hiddenFill>
             </a:ext>
             <a:ext uri="{91240B29-F687-4F45-9708-019B960494DF}">
-              <a14:hiddenLine xmlns:a14="http://schemas.microsoft.com/office/drawing/2010/main" xmlns="" w="9525">
+              <a14:hiddenLine xmlns:a14="http://schemas.microsoft.com/office/drawing/2010/main" w="9525">
                 <a:solidFill>
                   <a:srgbClr val="000000"/>
                 </a:solidFill>
@@ -16396,7 +16074,7 @@
           <a:blip r:embed="rId6" cstate="print">
             <a:extLst>
               <a:ext uri="{28A0092B-C50C-407E-A947-70E740481C1C}">
-                <a14:useLocalDpi xmlns:a14="http://schemas.microsoft.com/office/drawing/2010/main" xmlns="" val="0"/>
+                <a14:useLocalDpi xmlns:a14="http://schemas.microsoft.com/office/drawing/2010/main" val="0"/>
               </a:ext>
             </a:extLst>
           </a:blip>
@@ -16419,14 +16097,14 @@
           </a:ln>
           <a:extLst>
             <a:ext uri="{909E8E84-426E-40DD-AFC4-6F175D3DCCD1}">
-              <a14:hiddenFill xmlns:a14="http://schemas.microsoft.com/office/drawing/2010/main" xmlns="">
+              <a14:hiddenFill xmlns:a14="http://schemas.microsoft.com/office/drawing/2010/main">
                 <a:solidFill>
                   <a:srgbClr val="FFFFFF"/>
                 </a:solidFill>
               </a14:hiddenFill>
             </a:ext>
             <a:ext uri="{91240B29-F687-4F45-9708-019B960494DF}">
-              <a14:hiddenLine xmlns:a14="http://schemas.microsoft.com/office/drawing/2010/main" xmlns="" w="9525">
+              <a14:hiddenLine xmlns:a14="http://schemas.microsoft.com/office/drawing/2010/main" w="9525">
                 <a:solidFill>
                   <a:srgbClr val="000000"/>
                 </a:solidFill>
@@ -16450,7 +16128,7 @@
           <a:blip r:embed="rId3" cstate="print">
             <a:extLst>
               <a:ext uri="{28A0092B-C50C-407E-A947-70E740481C1C}">
-                <a14:useLocalDpi xmlns:a14="http://schemas.microsoft.com/office/drawing/2010/main" xmlns="" val="0"/>
+                <a14:useLocalDpi xmlns:a14="http://schemas.microsoft.com/office/drawing/2010/main" val="0"/>
               </a:ext>
             </a:extLst>
           </a:blip>
@@ -16473,14 +16151,14 @@
           </a:ln>
           <a:extLst>
             <a:ext uri="{909E8E84-426E-40DD-AFC4-6F175D3DCCD1}">
-              <a14:hiddenFill xmlns:a14="http://schemas.microsoft.com/office/drawing/2010/main" xmlns="">
+              <a14:hiddenFill xmlns:a14="http://schemas.microsoft.com/office/drawing/2010/main">
                 <a:solidFill>
                   <a:srgbClr val="FFFFFF"/>
                 </a:solidFill>
               </a14:hiddenFill>
             </a:ext>
             <a:ext uri="{91240B29-F687-4F45-9708-019B960494DF}">
-              <a14:hiddenLine xmlns:a14="http://schemas.microsoft.com/office/drawing/2010/main" xmlns="" w="9525">
+              <a14:hiddenLine xmlns:a14="http://schemas.microsoft.com/office/drawing/2010/main" w="9525">
                 <a:solidFill>
                   <a:srgbClr val="000000"/>
                 </a:solidFill>
@@ -16504,7 +16182,7 @@
           <a:blip r:embed="rId7" cstate="print">
             <a:extLst>
               <a:ext uri="{28A0092B-C50C-407E-A947-70E740481C1C}">
-                <a14:useLocalDpi xmlns:a14="http://schemas.microsoft.com/office/drawing/2010/main" xmlns="" val="0"/>
+                <a14:useLocalDpi xmlns:a14="http://schemas.microsoft.com/office/drawing/2010/main" val="0"/>
               </a:ext>
             </a:extLst>
           </a:blip>
@@ -16527,14 +16205,14 @@
           </a:ln>
           <a:extLst>
             <a:ext uri="{909E8E84-426E-40DD-AFC4-6F175D3DCCD1}">
-              <a14:hiddenFill xmlns:a14="http://schemas.microsoft.com/office/drawing/2010/main" xmlns="">
+              <a14:hiddenFill xmlns:a14="http://schemas.microsoft.com/office/drawing/2010/main">
                 <a:solidFill>
                   <a:srgbClr val="FFFFFF"/>
                 </a:solidFill>
               </a14:hiddenFill>
             </a:ext>
             <a:ext uri="{91240B29-F687-4F45-9708-019B960494DF}">
-              <a14:hiddenLine xmlns:a14="http://schemas.microsoft.com/office/drawing/2010/main" xmlns="" w="9525">
+              <a14:hiddenLine xmlns:a14="http://schemas.microsoft.com/office/drawing/2010/main" w="9525">
                 <a:solidFill>
                   <a:srgbClr val="000000"/>
                 </a:solidFill>
@@ -16558,7 +16236,7 @@
           <a:blip r:embed="rId8" cstate="print">
             <a:extLst>
               <a:ext uri="{28A0092B-C50C-407E-A947-70E740481C1C}">
-                <a14:useLocalDpi xmlns:a14="http://schemas.microsoft.com/office/drawing/2010/main" xmlns="" val="0"/>
+                <a14:useLocalDpi xmlns:a14="http://schemas.microsoft.com/office/drawing/2010/main" val="0"/>
               </a:ext>
             </a:extLst>
           </a:blip>
@@ -16581,14 +16259,14 @@
           </a:ln>
           <a:extLst>
             <a:ext uri="{909E8E84-426E-40DD-AFC4-6F175D3DCCD1}">
-              <a14:hiddenFill xmlns:a14="http://schemas.microsoft.com/office/drawing/2010/main" xmlns="">
+              <a14:hiddenFill xmlns:a14="http://schemas.microsoft.com/office/drawing/2010/main">
                 <a:solidFill>
                   <a:srgbClr val="FFFFFF"/>
                 </a:solidFill>
               </a14:hiddenFill>
             </a:ext>
             <a:ext uri="{91240B29-F687-4F45-9708-019B960494DF}">
-              <a14:hiddenLine xmlns:a14="http://schemas.microsoft.com/office/drawing/2010/main" xmlns="" w="9525">
+              <a14:hiddenLine xmlns:a14="http://schemas.microsoft.com/office/drawing/2010/main" w="9525">
                 <a:solidFill>
                   <a:srgbClr val="000000"/>
                 </a:solidFill>
@@ -16612,7 +16290,7 @@
           <a:blip r:embed="rId9" cstate="print">
             <a:extLst>
               <a:ext uri="{28A0092B-C50C-407E-A947-70E740481C1C}">
-                <a14:useLocalDpi xmlns:a14="http://schemas.microsoft.com/office/drawing/2010/main" xmlns="" val="0"/>
+                <a14:useLocalDpi xmlns:a14="http://schemas.microsoft.com/office/drawing/2010/main" val="0"/>
               </a:ext>
             </a:extLst>
           </a:blip>
@@ -16635,14 +16313,14 @@
           </a:ln>
           <a:extLst>
             <a:ext uri="{909E8E84-426E-40DD-AFC4-6F175D3DCCD1}">
-              <a14:hiddenFill xmlns:a14="http://schemas.microsoft.com/office/drawing/2010/main" xmlns="">
+              <a14:hiddenFill xmlns:a14="http://schemas.microsoft.com/office/drawing/2010/main">
                 <a:solidFill>
                   <a:srgbClr val="FFFFFF"/>
                 </a:solidFill>
               </a14:hiddenFill>
             </a:ext>
             <a:ext uri="{91240B29-F687-4F45-9708-019B960494DF}">
-              <a14:hiddenLine xmlns:a14="http://schemas.microsoft.com/office/drawing/2010/main" xmlns="" w="9525">
+              <a14:hiddenLine xmlns:a14="http://schemas.microsoft.com/office/drawing/2010/main" w="9525">
                 <a:solidFill>
                   <a:srgbClr val="000000"/>
                 </a:solidFill>
@@ -16666,7 +16344,7 @@
           <a:blip r:embed="rId10" cstate="print">
             <a:extLst>
               <a:ext uri="{28A0092B-C50C-407E-A947-70E740481C1C}">
-                <a14:useLocalDpi xmlns:a14="http://schemas.microsoft.com/office/drawing/2010/main" xmlns="" val="0"/>
+                <a14:useLocalDpi xmlns:a14="http://schemas.microsoft.com/office/drawing/2010/main" val="0"/>
               </a:ext>
             </a:extLst>
           </a:blip>
@@ -16689,14 +16367,14 @@
           </a:ln>
           <a:extLst>
             <a:ext uri="{909E8E84-426E-40DD-AFC4-6F175D3DCCD1}">
-              <a14:hiddenFill xmlns:a14="http://schemas.microsoft.com/office/drawing/2010/main" xmlns="">
+              <a14:hiddenFill xmlns:a14="http://schemas.microsoft.com/office/drawing/2010/main">
                 <a:solidFill>
                   <a:srgbClr val="FFFFFF"/>
                 </a:solidFill>
               </a14:hiddenFill>
             </a:ext>
             <a:ext uri="{91240B29-F687-4F45-9708-019B960494DF}">
-              <a14:hiddenLine xmlns:a14="http://schemas.microsoft.com/office/drawing/2010/main" xmlns="" w="9525">
+              <a14:hiddenLine xmlns:a14="http://schemas.microsoft.com/office/drawing/2010/main" w="9525">
                 <a:solidFill>
                   <a:srgbClr val="000000"/>
                 </a:solidFill>
@@ -16720,7 +16398,7 @@
           <a:blip r:embed="rId11" cstate="print">
             <a:extLst>
               <a:ext uri="{28A0092B-C50C-407E-A947-70E740481C1C}">
-                <a14:useLocalDpi xmlns:a14="http://schemas.microsoft.com/office/drawing/2010/main" xmlns="" val="0"/>
+                <a14:useLocalDpi xmlns:a14="http://schemas.microsoft.com/office/drawing/2010/main" val="0"/>
               </a:ext>
             </a:extLst>
           </a:blip>
@@ -16750,7 +16428,7 @@
           <a:blip r:embed="rId12" cstate="print">
             <a:extLst>
               <a:ext uri="{28A0092B-C50C-407E-A947-70E740481C1C}">
-                <a14:useLocalDpi xmlns:a14="http://schemas.microsoft.com/office/drawing/2010/main" xmlns="" val="0"/>
+                <a14:useLocalDpi xmlns:a14="http://schemas.microsoft.com/office/drawing/2010/main" val="0"/>
               </a:ext>
             </a:extLst>
           </a:blip>
@@ -16780,7 +16458,7 @@
           <a:blip r:embed="rId13" cstate="print">
             <a:extLst>
               <a:ext uri="{28A0092B-C50C-407E-A947-70E740481C1C}">
-                <a14:useLocalDpi xmlns:a14="http://schemas.microsoft.com/office/drawing/2010/main" xmlns="" val="0"/>
+                <a14:useLocalDpi xmlns:a14="http://schemas.microsoft.com/office/drawing/2010/main" val="0"/>
               </a:ext>
             </a:extLst>
           </a:blip>
@@ -16810,7 +16488,7 @@
           <a:blip r:embed="rId14" cstate="print">
             <a:extLst>
               <a:ext uri="{28A0092B-C50C-407E-A947-70E740481C1C}">
-                <a14:useLocalDpi xmlns:a14="http://schemas.microsoft.com/office/drawing/2010/main" xmlns="" val="0"/>
+                <a14:useLocalDpi xmlns:a14="http://schemas.microsoft.com/office/drawing/2010/main" val="0"/>
               </a:ext>
             </a:extLst>
           </a:blip>
@@ -16840,7 +16518,7 @@
           <a:blip r:embed="rId15" cstate="print">
             <a:extLst>
               <a:ext uri="{28A0092B-C50C-407E-A947-70E740481C1C}">
-                <a14:useLocalDpi xmlns:a14="http://schemas.microsoft.com/office/drawing/2010/main" xmlns="" val="0"/>
+                <a14:useLocalDpi xmlns:a14="http://schemas.microsoft.com/office/drawing/2010/main" val="0"/>
               </a:ext>
             </a:extLst>
           </a:blip>
@@ -16870,7 +16548,7 @@
           <a:blip r:embed="rId16" cstate="print">
             <a:extLst>
               <a:ext uri="{28A0092B-C50C-407E-A947-70E740481C1C}">
-                <a14:useLocalDpi xmlns:a14="http://schemas.microsoft.com/office/drawing/2010/main" xmlns="" val="0"/>
+                <a14:useLocalDpi xmlns:a14="http://schemas.microsoft.com/office/drawing/2010/main" val="0"/>
               </a:ext>
             </a:extLst>
           </a:blip>
@@ -16900,7 +16578,7 @@
           <a:blip r:embed="rId17" cstate="print">
             <a:extLst>
               <a:ext uri="{28A0092B-C50C-407E-A947-70E740481C1C}">
-                <a14:useLocalDpi xmlns:a14="http://schemas.microsoft.com/office/drawing/2010/main" xmlns="" val="0"/>
+                <a14:useLocalDpi xmlns:a14="http://schemas.microsoft.com/office/drawing/2010/main" val="0"/>
               </a:ext>
             </a:extLst>
           </a:blip>
@@ -17128,7 +16806,7 @@
           <a:blip r:embed="rId3" cstate="print">
             <a:extLst>
               <a:ext uri="{28A0092B-C50C-407E-A947-70E740481C1C}">
-                <a14:useLocalDpi xmlns:a14="http://schemas.microsoft.com/office/drawing/2010/main" xmlns="" val="0"/>
+                <a14:useLocalDpi xmlns:a14="http://schemas.microsoft.com/office/drawing/2010/main" val="0"/>
               </a:ext>
             </a:extLst>
           </a:blip>
@@ -17151,14 +16829,14 @@
           </a:ln>
           <a:extLst>
             <a:ext uri="{909E8E84-426E-40DD-AFC4-6F175D3DCCD1}">
-              <a14:hiddenFill xmlns:a14="http://schemas.microsoft.com/office/drawing/2010/main" xmlns="">
+              <a14:hiddenFill xmlns:a14="http://schemas.microsoft.com/office/drawing/2010/main">
                 <a:solidFill>
                   <a:schemeClr val="accent1"/>
                 </a:solidFill>
               </a14:hiddenFill>
             </a:ext>
             <a:ext uri="{91240B29-F687-4F45-9708-019B960494DF}">
-              <a14:hiddenLine xmlns:a14="http://schemas.microsoft.com/office/drawing/2010/main" xmlns="" w="9525">
+              <a14:hiddenLine xmlns:a14="http://schemas.microsoft.com/office/drawing/2010/main" w="9525">
                 <a:solidFill>
                   <a:schemeClr val="tx1"/>
                 </a:solidFill>
@@ -17325,7 +17003,7 @@
           <a:blip r:embed="rId3" cstate="print">
             <a:extLst>
               <a:ext uri="{28A0092B-C50C-407E-A947-70E740481C1C}">
-                <a14:useLocalDpi xmlns:a14="http://schemas.microsoft.com/office/drawing/2010/main" xmlns="" val="0"/>
+                <a14:useLocalDpi xmlns:a14="http://schemas.microsoft.com/office/drawing/2010/main" val="0"/>
               </a:ext>
             </a:extLst>
           </a:blip>
@@ -17348,14 +17026,14 @@
           </a:ln>
           <a:extLst>
             <a:ext uri="{909E8E84-426E-40DD-AFC4-6F175D3DCCD1}">
-              <a14:hiddenFill xmlns:a14="http://schemas.microsoft.com/office/drawing/2010/main" xmlns="">
+              <a14:hiddenFill xmlns:a14="http://schemas.microsoft.com/office/drawing/2010/main">
                 <a:solidFill>
                   <a:schemeClr val="accent1"/>
                 </a:solidFill>
               </a14:hiddenFill>
             </a:ext>
             <a:ext uri="{91240B29-F687-4F45-9708-019B960494DF}">
-              <a14:hiddenLine xmlns:a14="http://schemas.microsoft.com/office/drawing/2010/main" xmlns="" w="9525">
+              <a14:hiddenLine xmlns:a14="http://schemas.microsoft.com/office/drawing/2010/main" w="9525">
                 <a:solidFill>
                   <a:schemeClr val="tx1"/>
                 </a:solidFill>
@@ -17370,7 +17048,7 @@
     </p:spTree>
     <p:extLst>
       <p:ext uri="{BB962C8B-B14F-4D97-AF65-F5344CB8AC3E}">
-        <p14:creationId xmlns:p14="http://schemas.microsoft.com/office/powerpoint/2010/main" xmlns="" val="3002842948"/>
+        <p14:creationId xmlns:p14="http://schemas.microsoft.com/office/powerpoint/2010/main" val="3002842948"/>
       </p:ext>
     </p:extLst>
   </p:cSld>
@@ -17527,7 +17205,7 @@
           <a:blip r:embed="rId3" cstate="print">
             <a:extLst>
               <a:ext uri="{28A0092B-C50C-407E-A947-70E740481C1C}">
-                <a14:useLocalDpi xmlns:a14="http://schemas.microsoft.com/office/drawing/2010/main" xmlns="" val="0"/>
+                <a14:useLocalDpi xmlns:a14="http://schemas.microsoft.com/office/drawing/2010/main" val="0"/>
               </a:ext>
             </a:extLst>
           </a:blip>
@@ -17550,14 +17228,14 @@
           </a:ln>
           <a:extLst>
             <a:ext uri="{909E8E84-426E-40DD-AFC4-6F175D3DCCD1}">
-              <a14:hiddenFill xmlns:a14="http://schemas.microsoft.com/office/drawing/2010/main" xmlns="">
+              <a14:hiddenFill xmlns:a14="http://schemas.microsoft.com/office/drawing/2010/main">
                 <a:solidFill>
                   <a:schemeClr val="accent1"/>
                 </a:solidFill>
               </a14:hiddenFill>
             </a:ext>
             <a:ext uri="{91240B29-F687-4F45-9708-019B960494DF}">
-              <a14:hiddenLine xmlns:a14="http://schemas.microsoft.com/office/drawing/2010/main" xmlns="" w="9525">
+              <a14:hiddenLine xmlns:a14="http://schemas.microsoft.com/office/drawing/2010/main" w="9525">
                 <a:solidFill>
                   <a:schemeClr val="tx1"/>
                 </a:solidFill>
@@ -17636,7 +17314,7 @@
           <a:blip r:embed="rId3" cstate="print">
             <a:extLst>
               <a:ext uri="{28A0092B-C50C-407E-A947-70E740481C1C}">
-                <a14:useLocalDpi xmlns:a14="http://schemas.microsoft.com/office/drawing/2010/main" xmlns="" val="0"/>
+                <a14:useLocalDpi xmlns:a14="http://schemas.microsoft.com/office/drawing/2010/main" val="0"/>
               </a:ext>
             </a:extLst>
           </a:blip>
@@ -17659,14 +17337,14 @@
           </a:ln>
           <a:extLst>
             <a:ext uri="{909E8E84-426E-40DD-AFC4-6F175D3DCCD1}">
-              <a14:hiddenFill xmlns:a14="http://schemas.microsoft.com/office/drawing/2010/main" xmlns="">
+              <a14:hiddenFill xmlns:a14="http://schemas.microsoft.com/office/drawing/2010/main">
                 <a:solidFill>
                   <a:schemeClr val="accent1"/>
                 </a:solidFill>
               </a14:hiddenFill>
             </a:ext>
             <a:ext uri="{91240B29-F687-4F45-9708-019B960494DF}">
-              <a14:hiddenLine xmlns:a14="http://schemas.microsoft.com/office/drawing/2010/main" xmlns="" w="9525">
+              <a14:hiddenLine xmlns:a14="http://schemas.microsoft.com/office/drawing/2010/main" w="9525">
                 <a:solidFill>
                   <a:schemeClr val="tx1"/>
                 </a:solidFill>
@@ -17690,7 +17368,7 @@
           <a:blip r:embed="rId4" cstate="print">
             <a:extLst>
               <a:ext uri="{28A0092B-C50C-407E-A947-70E740481C1C}">
-                <a14:useLocalDpi xmlns:a14="http://schemas.microsoft.com/office/drawing/2010/main" xmlns="" val="0"/>
+                <a14:useLocalDpi xmlns:a14="http://schemas.microsoft.com/office/drawing/2010/main" val="0"/>
               </a:ext>
             </a:extLst>
           </a:blip>
@@ -17713,14 +17391,14 @@
           </a:ln>
           <a:extLst>
             <a:ext uri="{909E8E84-426E-40DD-AFC4-6F175D3DCCD1}">
-              <a14:hiddenFill xmlns:a14="http://schemas.microsoft.com/office/drawing/2010/main" xmlns="">
+              <a14:hiddenFill xmlns:a14="http://schemas.microsoft.com/office/drawing/2010/main">
                 <a:solidFill>
                   <a:schemeClr val="accent1"/>
                 </a:solidFill>
               </a14:hiddenFill>
             </a:ext>
             <a:ext uri="{91240B29-F687-4F45-9708-019B960494DF}">
-              <a14:hiddenLine xmlns:a14="http://schemas.microsoft.com/office/drawing/2010/main" xmlns="" w="9525">
+              <a14:hiddenLine xmlns:a14="http://schemas.microsoft.com/office/drawing/2010/main" w="9525">
                 <a:solidFill>
                   <a:schemeClr val="tx1"/>
                 </a:solidFill>
@@ -17932,7 +17610,7 @@
           <a:blip r:embed="rId3" cstate="print">
             <a:extLst>
               <a:ext uri="{28A0092B-C50C-407E-A947-70E740481C1C}">
-                <a14:useLocalDpi xmlns:a14="http://schemas.microsoft.com/office/drawing/2010/main" xmlns="" val="0"/>
+                <a14:useLocalDpi xmlns:a14="http://schemas.microsoft.com/office/drawing/2010/main" val="0"/>
               </a:ext>
             </a:extLst>
           </a:blip>
@@ -17955,14 +17633,14 @@
           </a:ln>
           <a:extLst>
             <a:ext uri="{909E8E84-426E-40DD-AFC4-6F175D3DCCD1}">
-              <a14:hiddenFill xmlns:a14="http://schemas.microsoft.com/office/drawing/2010/main" xmlns="">
+              <a14:hiddenFill xmlns:a14="http://schemas.microsoft.com/office/drawing/2010/main">
                 <a:solidFill>
                   <a:schemeClr val="accent1"/>
                 </a:solidFill>
               </a14:hiddenFill>
             </a:ext>
             <a:ext uri="{91240B29-F687-4F45-9708-019B960494DF}">
-              <a14:hiddenLine xmlns:a14="http://schemas.microsoft.com/office/drawing/2010/main" xmlns="" w="9525">
+              <a14:hiddenLine xmlns:a14="http://schemas.microsoft.com/office/drawing/2010/main" w="9525">
                 <a:solidFill>
                   <a:schemeClr val="tx1"/>
                 </a:solidFill>
@@ -18061,7 +17739,7 @@
           <a:blip r:embed="rId3" cstate="print">
             <a:extLst>
               <a:ext uri="{28A0092B-C50C-407E-A947-70E740481C1C}">
-                <a14:useLocalDpi xmlns:a14="http://schemas.microsoft.com/office/drawing/2010/main" xmlns="" val="0"/>
+                <a14:useLocalDpi xmlns:a14="http://schemas.microsoft.com/office/drawing/2010/main" val="0"/>
               </a:ext>
             </a:extLst>
           </a:blip>
@@ -18084,14 +17762,14 @@
           </a:ln>
           <a:extLst>
             <a:ext uri="{909E8E84-426E-40DD-AFC4-6F175D3DCCD1}">
-              <a14:hiddenFill xmlns:a14="http://schemas.microsoft.com/office/drawing/2010/main" xmlns="">
+              <a14:hiddenFill xmlns:a14="http://schemas.microsoft.com/office/drawing/2010/main">
                 <a:solidFill>
                   <a:schemeClr val="accent1"/>
                 </a:solidFill>
               </a14:hiddenFill>
             </a:ext>
             <a:ext uri="{91240B29-F687-4F45-9708-019B960494DF}">
-              <a14:hiddenLine xmlns:a14="http://schemas.microsoft.com/office/drawing/2010/main" xmlns="" w="9525">
+              <a14:hiddenLine xmlns:a14="http://schemas.microsoft.com/office/drawing/2010/main" w="9525">
                 <a:solidFill>
                   <a:schemeClr val="tx1"/>
                 </a:solidFill>
@@ -18257,7 +17935,7 @@
           <a:blip r:embed="rId3" cstate="print">
             <a:extLst>
               <a:ext uri="{28A0092B-C50C-407E-A947-70E740481C1C}">
-                <a14:useLocalDpi xmlns:a14="http://schemas.microsoft.com/office/drawing/2010/main" xmlns="" val="0"/>
+                <a14:useLocalDpi xmlns:a14="http://schemas.microsoft.com/office/drawing/2010/main" val="0"/>
               </a:ext>
             </a:extLst>
           </a:blip>
@@ -18280,14 +17958,14 @@
           </a:ln>
           <a:extLst>
             <a:ext uri="{909E8E84-426E-40DD-AFC4-6F175D3DCCD1}">
-              <a14:hiddenFill xmlns:a14="http://schemas.microsoft.com/office/drawing/2010/main" xmlns="">
+              <a14:hiddenFill xmlns:a14="http://schemas.microsoft.com/office/drawing/2010/main">
                 <a:solidFill>
                   <a:schemeClr val="accent1"/>
                 </a:solidFill>
               </a14:hiddenFill>
             </a:ext>
             <a:ext uri="{91240B29-F687-4F45-9708-019B960494DF}">
-              <a14:hiddenLine xmlns:a14="http://schemas.microsoft.com/office/drawing/2010/main" xmlns="" w="9525">
+              <a14:hiddenLine xmlns:a14="http://schemas.microsoft.com/office/drawing/2010/main" w="9525">
                 <a:solidFill>
                   <a:schemeClr val="tx1"/>
                 </a:solidFill>
@@ -18302,7 +17980,7 @@
     </p:spTree>
     <p:extLst>
       <p:ext uri="{BB962C8B-B14F-4D97-AF65-F5344CB8AC3E}">
-        <p14:creationId xmlns:p14="http://schemas.microsoft.com/office/powerpoint/2010/main" xmlns="" val="1356894037"/>
+        <p14:creationId xmlns:p14="http://schemas.microsoft.com/office/powerpoint/2010/main" val="1356894037"/>
       </p:ext>
     </p:extLst>
   </p:cSld>
@@ -18557,7 +18235,7 @@
           <a:blip r:embed="rId3" cstate="print">
             <a:extLst>
               <a:ext uri="{28A0092B-C50C-407E-A947-70E740481C1C}">
-                <a14:useLocalDpi xmlns:a14="http://schemas.microsoft.com/office/drawing/2010/main" xmlns="" val="0"/>
+                <a14:useLocalDpi xmlns:a14="http://schemas.microsoft.com/office/drawing/2010/main" val="0"/>
               </a:ext>
             </a:extLst>
           </a:blip>
@@ -18580,14 +18258,14 @@
           </a:ln>
           <a:extLst>
             <a:ext uri="{909E8E84-426E-40DD-AFC4-6F175D3DCCD1}">
-              <a14:hiddenFill xmlns:a14="http://schemas.microsoft.com/office/drawing/2010/main" xmlns="">
+              <a14:hiddenFill xmlns:a14="http://schemas.microsoft.com/office/drawing/2010/main">
                 <a:solidFill>
                   <a:schemeClr val="accent1"/>
                 </a:solidFill>
               </a14:hiddenFill>
             </a:ext>
             <a:ext uri="{91240B29-F687-4F45-9708-019B960494DF}">
-              <a14:hiddenLine xmlns:a14="http://schemas.microsoft.com/office/drawing/2010/main" xmlns="" w="9525">
+              <a14:hiddenLine xmlns:a14="http://schemas.microsoft.com/office/drawing/2010/main" w="9525">
                 <a:solidFill>
                   <a:schemeClr val="tx1"/>
                 </a:solidFill>
@@ -18602,7 +18280,7 @@
     </p:spTree>
     <p:extLst>
       <p:ext uri="{BB962C8B-B14F-4D97-AF65-F5344CB8AC3E}">
-        <p14:creationId xmlns:p14="http://schemas.microsoft.com/office/powerpoint/2010/main" xmlns="" val="3010516162"/>
+        <p14:creationId xmlns:p14="http://schemas.microsoft.com/office/powerpoint/2010/main" val="3010516162"/>
       </p:ext>
     </p:extLst>
   </p:cSld>
@@ -18759,7 +18437,7 @@
           <a:blip r:embed="rId3" cstate="print">
             <a:extLst>
               <a:ext uri="{28A0092B-C50C-407E-A947-70E740481C1C}">
-                <a14:useLocalDpi xmlns:a14="http://schemas.microsoft.com/office/drawing/2010/main" xmlns="" val="0"/>
+                <a14:useLocalDpi xmlns:a14="http://schemas.microsoft.com/office/drawing/2010/main" val="0"/>
               </a:ext>
             </a:extLst>
           </a:blip>
@@ -18782,14 +18460,14 @@
           </a:ln>
           <a:extLst>
             <a:ext uri="{909E8E84-426E-40DD-AFC4-6F175D3DCCD1}">
-              <a14:hiddenFill xmlns:a14="http://schemas.microsoft.com/office/drawing/2010/main" xmlns="">
+              <a14:hiddenFill xmlns:a14="http://schemas.microsoft.com/office/drawing/2010/main">
                 <a:solidFill>
                   <a:schemeClr val="accent1"/>
                 </a:solidFill>
               </a14:hiddenFill>
             </a:ext>
             <a:ext uri="{91240B29-F687-4F45-9708-019B960494DF}">
-              <a14:hiddenLine xmlns:a14="http://schemas.microsoft.com/office/drawing/2010/main" xmlns="" w="9525">
+              <a14:hiddenLine xmlns:a14="http://schemas.microsoft.com/office/drawing/2010/main" w="9525">
                 <a:solidFill>
                   <a:schemeClr val="tx1"/>
                 </a:solidFill>
@@ -19034,7 +18712,7 @@
           <a:blip r:embed="rId3" cstate="print">
             <a:extLst>
               <a:ext uri="{28A0092B-C50C-407E-A947-70E740481C1C}">
-                <a14:useLocalDpi xmlns:a14="http://schemas.microsoft.com/office/drawing/2010/main" xmlns="" val="0"/>
+                <a14:useLocalDpi xmlns:a14="http://schemas.microsoft.com/office/drawing/2010/main" val="0"/>
               </a:ext>
             </a:extLst>
           </a:blip>
@@ -19054,7 +18732,7 @@
           <a:noFill/>
           <a:extLst>
             <a:ext uri="{909E8E84-426E-40DD-AFC4-6F175D3DCCD1}">
-              <a14:hiddenFill xmlns:a14="http://schemas.microsoft.com/office/drawing/2010/main" xmlns="">
+              <a14:hiddenFill xmlns:a14="http://schemas.microsoft.com/office/drawing/2010/main">
                 <a:solidFill>
                   <a:srgbClr val="FFFFFF"/>
                 </a:solidFill>
@@ -19546,13 +19224,8 @@
             </a:pPr>
             <a:r>
               <a:rPr lang="en-NZ" sz="2400" dirty="0" smtClean="0"/>
-              <a:t>Then add a new </a:t>
-            </a:r>
-            <a:r>
-              <a:rPr lang="en-NZ" sz="2400" dirty="0" smtClean="0"/>
-              <a:t>continent with its own animals.</a:t>
-            </a:r>
-            <a:endParaRPr lang="en-NZ" sz="2400" dirty="0" smtClean="0"/>
+              <a:t>Then add a new continent with its own animals.</a:t>
+            </a:r>
           </a:p>
           <a:p>
             <a:r>
@@ -20248,7 +19921,7 @@
           <a:blip r:embed="rId3" cstate="print">
             <a:extLst>
               <a:ext uri="{28A0092B-C50C-407E-A947-70E740481C1C}">
-                <a14:useLocalDpi xmlns:a14="http://schemas.microsoft.com/office/drawing/2010/main" xmlns="" val="0"/>
+                <a14:useLocalDpi xmlns:a14="http://schemas.microsoft.com/office/drawing/2010/main" val="0"/>
               </a:ext>
             </a:extLst>
           </a:blip>
@@ -20271,14 +19944,14 @@
           </a:ln>
           <a:extLst>
             <a:ext uri="{909E8E84-426E-40DD-AFC4-6F175D3DCCD1}">
-              <a14:hiddenFill xmlns:a14="http://schemas.microsoft.com/office/drawing/2010/main" xmlns="">
+              <a14:hiddenFill xmlns:a14="http://schemas.microsoft.com/office/drawing/2010/main">
                 <a:solidFill>
                   <a:schemeClr val="accent1"/>
                 </a:solidFill>
               </a14:hiddenFill>
             </a:ext>
             <a:ext uri="{91240B29-F687-4F45-9708-019B960494DF}">
-              <a14:hiddenLine xmlns:a14="http://schemas.microsoft.com/office/drawing/2010/main" xmlns="" w="9525">
+              <a14:hiddenLine xmlns:a14="http://schemas.microsoft.com/office/drawing/2010/main" w="9525">
                 <a:solidFill>
                   <a:schemeClr val="tx1"/>
                 </a:solidFill>
@@ -20293,7 +19966,7 @@
     </p:spTree>
     <p:extLst>
       <p:ext uri="{BB962C8B-B14F-4D97-AF65-F5344CB8AC3E}">
-        <p14:creationId xmlns:p14="http://schemas.microsoft.com/office/powerpoint/2010/main" xmlns="" val="2140476182"/>
+        <p14:creationId xmlns:p14="http://schemas.microsoft.com/office/powerpoint/2010/main" val="2140476182"/>
       </p:ext>
     </p:extLst>
   </p:cSld>
@@ -20449,7 +20122,7 @@
           <a:blip r:embed="rId3" cstate="print">
             <a:extLst>
               <a:ext uri="{28A0092B-C50C-407E-A947-70E740481C1C}">
-                <a14:useLocalDpi xmlns:a14="http://schemas.microsoft.com/office/drawing/2010/main" xmlns="" val="0"/>
+                <a14:useLocalDpi xmlns:a14="http://schemas.microsoft.com/office/drawing/2010/main" val="0"/>
               </a:ext>
             </a:extLst>
           </a:blip>
@@ -20472,14 +20145,14 @@
           </a:ln>
           <a:extLst>
             <a:ext uri="{909E8E84-426E-40DD-AFC4-6F175D3DCCD1}">
-              <a14:hiddenFill xmlns:a14="http://schemas.microsoft.com/office/drawing/2010/main" xmlns="">
+              <a14:hiddenFill xmlns:a14="http://schemas.microsoft.com/office/drawing/2010/main">
                 <a:solidFill>
                   <a:schemeClr val="accent1"/>
                 </a:solidFill>
               </a14:hiddenFill>
             </a:ext>
             <a:ext uri="{91240B29-F687-4F45-9708-019B960494DF}">
-              <a14:hiddenLine xmlns:a14="http://schemas.microsoft.com/office/drawing/2010/main" xmlns="" w="9525">
+              <a14:hiddenLine xmlns:a14="http://schemas.microsoft.com/office/drawing/2010/main" w="9525">
                 <a:solidFill>
                   <a:schemeClr val="tx1"/>
                 </a:solidFill>
@@ -20494,7 +20167,7 @@
     </p:spTree>
     <p:extLst>
       <p:ext uri="{BB962C8B-B14F-4D97-AF65-F5344CB8AC3E}">
-        <p14:creationId xmlns:p14="http://schemas.microsoft.com/office/powerpoint/2010/main" xmlns="" val="4138120649"/>
+        <p14:creationId xmlns:p14="http://schemas.microsoft.com/office/powerpoint/2010/main" val="4138120649"/>
       </p:ext>
     </p:extLst>
   </p:cSld>
@@ -20665,7 +20338,7 @@
     </p:spTree>
     <p:extLst>
       <p:ext uri="{BB962C8B-B14F-4D97-AF65-F5344CB8AC3E}">
-        <p14:creationId xmlns:p14="http://schemas.microsoft.com/office/powerpoint/2010/main" xmlns="" val="529872134"/>
+        <p14:creationId xmlns:p14="http://schemas.microsoft.com/office/powerpoint/2010/main" val="529872134"/>
       </p:ext>
     </p:extLst>
   </p:cSld>

</xml_diff>